<commit_message>
added timeline + new standup log
</commit_message>
<xml_diff>
--- a/project_journal/standup/presentations/sprint8_standup.pptx
+++ b/project_journal/standup/presentations/sprint8_standup.pptx
@@ -8,10 +8,15 @@
     <p:sldId id="256" r:id="rId2"/>
     <p:sldId id="262" r:id="rId3"/>
     <p:sldId id="257" r:id="rId4"/>
-    <p:sldId id="258" r:id="rId5"/>
-    <p:sldId id="261" r:id="rId6"/>
-    <p:sldId id="260" r:id="rId7"/>
-    <p:sldId id="259" r:id="rId8"/>
+    <p:sldId id="267" r:id="rId5"/>
+    <p:sldId id="258" r:id="rId6"/>
+    <p:sldId id="263" r:id="rId7"/>
+    <p:sldId id="264" r:id="rId8"/>
+    <p:sldId id="265" r:id="rId9"/>
+    <p:sldId id="266" r:id="rId10"/>
+    <p:sldId id="261" r:id="rId11"/>
+    <p:sldId id="260" r:id="rId12"/>
+    <p:sldId id="259" r:id="rId13"/>
   </p:sldIdLst>
   <p:sldSz cx="12192000" cy="6858000"/>
   <p:notesSz cx="6858000" cy="9144000"/>
@@ -265,7 +270,7 @@
           <a:p>
             <a:fld id="{C5760A9E-F5D7-4040-B515-3D966B4E754C}" type="datetimeFigureOut">
               <a:rPr lang="en-US" smtClean="0"/>
-              <a:t>9/4/2025</a:t>
+              <a:t>9/5/2025</a:t>
             </a:fld>
             <a:endParaRPr lang="en-US"/>
           </a:p>
@@ -463,7 +468,7 @@
           <a:p>
             <a:fld id="{C5760A9E-F5D7-4040-B515-3D966B4E754C}" type="datetimeFigureOut">
               <a:rPr lang="en-US" smtClean="0"/>
-              <a:t>9/4/2025</a:t>
+              <a:t>9/5/2025</a:t>
             </a:fld>
             <a:endParaRPr lang="en-US"/>
           </a:p>
@@ -671,7 +676,7 @@
           <a:p>
             <a:fld id="{C5760A9E-F5D7-4040-B515-3D966B4E754C}" type="datetimeFigureOut">
               <a:rPr lang="en-US" smtClean="0"/>
-              <a:t>9/4/2025</a:t>
+              <a:t>9/5/2025</a:t>
             </a:fld>
             <a:endParaRPr lang="en-US"/>
           </a:p>
@@ -869,7 +874,7 @@
           <a:p>
             <a:fld id="{C5760A9E-F5D7-4040-B515-3D966B4E754C}" type="datetimeFigureOut">
               <a:rPr lang="en-US" smtClean="0"/>
-              <a:t>9/4/2025</a:t>
+              <a:t>9/5/2025</a:t>
             </a:fld>
             <a:endParaRPr lang="en-US"/>
           </a:p>
@@ -1144,7 +1149,7 @@
           <a:p>
             <a:fld id="{C5760A9E-F5D7-4040-B515-3D966B4E754C}" type="datetimeFigureOut">
               <a:rPr lang="en-US" smtClean="0"/>
-              <a:t>9/4/2025</a:t>
+              <a:t>9/5/2025</a:t>
             </a:fld>
             <a:endParaRPr lang="en-US"/>
           </a:p>
@@ -1409,7 +1414,7 @@
           <a:p>
             <a:fld id="{C5760A9E-F5D7-4040-B515-3D966B4E754C}" type="datetimeFigureOut">
               <a:rPr lang="en-US" smtClean="0"/>
-              <a:t>9/4/2025</a:t>
+              <a:t>9/5/2025</a:t>
             </a:fld>
             <a:endParaRPr lang="en-US"/>
           </a:p>
@@ -1821,7 +1826,7 @@
           <a:p>
             <a:fld id="{C5760A9E-F5D7-4040-B515-3D966B4E754C}" type="datetimeFigureOut">
               <a:rPr lang="en-US" smtClean="0"/>
-              <a:t>9/4/2025</a:t>
+              <a:t>9/5/2025</a:t>
             </a:fld>
             <a:endParaRPr lang="en-US"/>
           </a:p>
@@ -1962,7 +1967,7 @@
           <a:p>
             <a:fld id="{C5760A9E-F5D7-4040-B515-3D966B4E754C}" type="datetimeFigureOut">
               <a:rPr lang="en-US" smtClean="0"/>
-              <a:t>9/4/2025</a:t>
+              <a:t>9/5/2025</a:t>
             </a:fld>
             <a:endParaRPr lang="en-US"/>
           </a:p>
@@ -2075,7 +2080,7 @@
           <a:p>
             <a:fld id="{C5760A9E-F5D7-4040-B515-3D966B4E754C}" type="datetimeFigureOut">
               <a:rPr lang="en-US" smtClean="0"/>
-              <a:t>9/4/2025</a:t>
+              <a:t>9/5/2025</a:t>
             </a:fld>
             <a:endParaRPr lang="en-US"/>
           </a:p>
@@ -2386,7 +2391,7 @@
           <a:p>
             <a:fld id="{C5760A9E-F5D7-4040-B515-3D966B4E754C}" type="datetimeFigureOut">
               <a:rPr lang="en-US" smtClean="0"/>
-              <a:t>9/4/2025</a:t>
+              <a:t>9/5/2025</a:t>
             </a:fld>
             <a:endParaRPr lang="en-US"/>
           </a:p>
@@ -2674,7 +2679,7 @@
           <a:p>
             <a:fld id="{C5760A9E-F5D7-4040-B515-3D966B4E754C}" type="datetimeFigureOut">
               <a:rPr lang="en-US" smtClean="0"/>
-              <a:t>9/4/2025</a:t>
+              <a:t>9/5/2025</a:t>
             </a:fld>
             <a:endParaRPr lang="en-US"/>
           </a:p>
@@ -2915,7 +2920,7 @@
           <a:p>
             <a:fld id="{C5760A9E-F5D7-4040-B515-3D966B4E754C}" type="datetimeFigureOut">
               <a:rPr lang="en-US" smtClean="0"/>
-              <a:t>9/4/2025</a:t>
+              <a:t>9/5/2025</a:t>
             </a:fld>
             <a:endParaRPr lang="en-US"/>
           </a:p>
@@ -3406,6 +3411,304 @@
 </p:sld>
 </file>
 
+<file path=ppt/slides/slide10.xml><?xml version="1.0" encoding="utf-8"?>
+<p:sld xmlns:a="http://schemas.openxmlformats.org/drawingml/2006/main" xmlns:r="http://schemas.openxmlformats.org/officeDocument/2006/relationships" xmlns:p="http://schemas.openxmlformats.org/presentationml/2006/main">
+  <p:cSld>
+    <p:spTree>
+      <p:nvGrpSpPr>
+        <p:cNvPr id="1" name=""/>
+        <p:cNvGrpSpPr/>
+        <p:nvPr/>
+      </p:nvGrpSpPr>
+      <p:grpSpPr>
+        <a:xfrm>
+          <a:off x="0" y="0"/>
+          <a:ext cx="0" cy="0"/>
+          <a:chOff x="0" y="0"/>
+          <a:chExt cx="0" cy="0"/>
+        </a:xfrm>
+      </p:grpSpPr>
+      <p:sp>
+        <p:nvSpPr>
+          <p:cNvPr id="2" name="Title 1">
+            <a:extLst>
+              <a:ext uri="{FF2B5EF4-FFF2-40B4-BE49-F238E27FC236}">
+                <a16:creationId xmlns:a16="http://schemas.microsoft.com/office/drawing/2014/main" id="{2C25A4FD-5639-4D22-DA86-0DAC040693AE}"/>
+              </a:ext>
+            </a:extLst>
+          </p:cNvPr>
+          <p:cNvSpPr>
+            <a:spLocks noGrp="1"/>
+          </p:cNvSpPr>
+          <p:nvPr>
+            <p:ph type="title"/>
+          </p:nvPr>
+        </p:nvSpPr>
+        <p:spPr/>
+        <p:txBody>
+          <a:bodyPr/>
+          <a:lstStyle/>
+          <a:p>
+            <a:r>
+              <a:rPr lang="en-US" dirty="0"/>
+              <a:t>Problems &amp; Blockers</a:t>
+            </a:r>
+          </a:p>
+        </p:txBody>
+      </p:sp>
+      <p:sp>
+        <p:nvSpPr>
+          <p:cNvPr id="3" name="Content Placeholder 2">
+            <a:extLst>
+              <a:ext uri="{FF2B5EF4-FFF2-40B4-BE49-F238E27FC236}">
+                <a16:creationId xmlns:a16="http://schemas.microsoft.com/office/drawing/2014/main" id="{C83917C6-300B-A2AC-532F-B793C935FCED}"/>
+              </a:ext>
+            </a:extLst>
+          </p:cNvPr>
+          <p:cNvSpPr>
+            <a:spLocks noGrp="1"/>
+          </p:cNvSpPr>
+          <p:nvPr>
+            <p:ph idx="1"/>
+          </p:nvPr>
+        </p:nvSpPr>
+        <p:spPr/>
+        <p:txBody>
+          <a:bodyPr/>
+          <a:lstStyle/>
+          <a:p>
+            <a:r>
+              <a:rPr lang="en-US" dirty="0"/>
+              <a:t>Swimlane diagrams increased scope</a:t>
+            </a:r>
+          </a:p>
+          <a:p>
+            <a:pPr lvl="1"/>
+            <a:r>
+              <a:rPr lang="en-US" dirty="0"/>
+              <a:t>Added a bunch of error handling logic, made things more complicated</a:t>
+            </a:r>
+          </a:p>
+          <a:p>
+            <a:r>
+              <a:rPr lang="en-US" dirty="0"/>
+              <a:t>Will take an entire month longer to complete</a:t>
+            </a:r>
+          </a:p>
+          <a:p>
+            <a:endParaRPr lang="en-US" dirty="0"/>
+          </a:p>
+          <a:p>
+            <a:endParaRPr lang="en-US" dirty="0"/>
+          </a:p>
+        </p:txBody>
+      </p:sp>
+    </p:spTree>
+    <p:extLst>
+      <p:ext uri="{BB962C8B-B14F-4D97-AF65-F5344CB8AC3E}">
+        <p14:creationId xmlns:p14="http://schemas.microsoft.com/office/powerpoint/2010/main" val="65931321"/>
+      </p:ext>
+    </p:extLst>
+  </p:cSld>
+  <p:clrMapOvr>
+    <a:masterClrMapping/>
+  </p:clrMapOvr>
+</p:sld>
+</file>
+
+<file path=ppt/slides/slide11.xml><?xml version="1.0" encoding="utf-8"?>
+<p:sld xmlns:a="http://schemas.openxmlformats.org/drawingml/2006/main" xmlns:r="http://schemas.openxmlformats.org/officeDocument/2006/relationships" xmlns:p="http://schemas.openxmlformats.org/presentationml/2006/main">
+  <p:cSld>
+    <p:spTree>
+      <p:nvGrpSpPr>
+        <p:cNvPr id="1" name=""/>
+        <p:cNvGrpSpPr/>
+        <p:nvPr/>
+      </p:nvGrpSpPr>
+      <p:grpSpPr>
+        <a:xfrm>
+          <a:off x="0" y="0"/>
+          <a:ext cx="0" cy="0"/>
+          <a:chOff x="0" y="0"/>
+          <a:chExt cx="0" cy="0"/>
+        </a:xfrm>
+      </p:grpSpPr>
+      <p:sp>
+        <p:nvSpPr>
+          <p:cNvPr id="2" name="Title 1">
+            <a:extLst>
+              <a:ext uri="{FF2B5EF4-FFF2-40B4-BE49-F238E27FC236}">
+                <a16:creationId xmlns:a16="http://schemas.microsoft.com/office/drawing/2014/main" id="{100BE286-544B-EB61-29BA-291842622BA9}"/>
+              </a:ext>
+            </a:extLst>
+          </p:cNvPr>
+          <p:cNvSpPr>
+            <a:spLocks noGrp="1"/>
+          </p:cNvSpPr>
+          <p:nvPr>
+            <p:ph type="title"/>
+          </p:nvPr>
+        </p:nvSpPr>
+        <p:spPr/>
+        <p:txBody>
+          <a:bodyPr/>
+          <a:lstStyle/>
+          <a:p>
+            <a:r>
+              <a:rPr lang="en-US" dirty="0"/>
+              <a:t>Pending Actions</a:t>
+            </a:r>
+          </a:p>
+        </p:txBody>
+      </p:sp>
+      <p:sp>
+        <p:nvSpPr>
+          <p:cNvPr id="3" name="Content Placeholder 2">
+            <a:extLst>
+              <a:ext uri="{FF2B5EF4-FFF2-40B4-BE49-F238E27FC236}">
+                <a16:creationId xmlns:a16="http://schemas.microsoft.com/office/drawing/2014/main" id="{65F23957-8987-5928-8255-5CEA3B725750}"/>
+              </a:ext>
+            </a:extLst>
+          </p:cNvPr>
+          <p:cNvSpPr>
+            <a:spLocks noGrp="1"/>
+          </p:cNvSpPr>
+          <p:nvPr>
+            <p:ph idx="1"/>
+          </p:nvPr>
+        </p:nvSpPr>
+        <p:spPr/>
+        <p:txBody>
+          <a:bodyPr/>
+          <a:lstStyle/>
+          <a:p>
+            <a:r>
+              <a:rPr lang="en-US" dirty="0"/>
+              <a:t>Subsystem Integration</a:t>
+            </a:r>
+          </a:p>
+        </p:txBody>
+      </p:sp>
+    </p:spTree>
+    <p:extLst>
+      <p:ext uri="{BB962C8B-B14F-4D97-AF65-F5344CB8AC3E}">
+        <p14:creationId xmlns:p14="http://schemas.microsoft.com/office/powerpoint/2010/main" val="955631175"/>
+      </p:ext>
+    </p:extLst>
+  </p:cSld>
+  <p:clrMapOvr>
+    <a:masterClrMapping/>
+  </p:clrMapOvr>
+</p:sld>
+</file>
+
+<file path=ppt/slides/slide12.xml><?xml version="1.0" encoding="utf-8"?>
+<p:sld xmlns:a="http://schemas.openxmlformats.org/drawingml/2006/main" xmlns:r="http://schemas.openxmlformats.org/officeDocument/2006/relationships" xmlns:p="http://schemas.openxmlformats.org/presentationml/2006/main">
+  <p:cSld>
+    <p:spTree>
+      <p:nvGrpSpPr>
+        <p:cNvPr id="1" name=""/>
+        <p:cNvGrpSpPr/>
+        <p:nvPr/>
+      </p:nvGrpSpPr>
+      <p:grpSpPr>
+        <a:xfrm>
+          <a:off x="0" y="0"/>
+          <a:ext cx="0" cy="0"/>
+          <a:chOff x="0" y="0"/>
+          <a:chExt cx="0" cy="0"/>
+        </a:xfrm>
+      </p:grpSpPr>
+      <p:sp>
+        <p:nvSpPr>
+          <p:cNvPr id="2" name="Title 1">
+            <a:extLst>
+              <a:ext uri="{FF2B5EF4-FFF2-40B4-BE49-F238E27FC236}">
+                <a16:creationId xmlns:a16="http://schemas.microsoft.com/office/drawing/2014/main" id="{E7E9563F-7A98-D517-B1E1-59F25A8ADA56}"/>
+              </a:ext>
+            </a:extLst>
+          </p:cNvPr>
+          <p:cNvSpPr>
+            <a:spLocks noGrp="1"/>
+          </p:cNvSpPr>
+          <p:nvPr>
+            <p:ph type="title"/>
+          </p:nvPr>
+        </p:nvSpPr>
+        <p:spPr/>
+        <p:txBody>
+          <a:bodyPr/>
+          <a:lstStyle/>
+          <a:p>
+            <a:r>
+              <a:rPr lang="en-US" dirty="0"/>
+              <a:t>Next Steps</a:t>
+            </a:r>
+          </a:p>
+        </p:txBody>
+      </p:sp>
+      <p:sp>
+        <p:nvSpPr>
+          <p:cNvPr id="3" name="Content Placeholder 2">
+            <a:extLst>
+              <a:ext uri="{FF2B5EF4-FFF2-40B4-BE49-F238E27FC236}">
+                <a16:creationId xmlns:a16="http://schemas.microsoft.com/office/drawing/2014/main" id="{57D1A68D-CC96-3D40-ED52-22E5DBBF94F9}"/>
+              </a:ext>
+            </a:extLst>
+          </p:cNvPr>
+          <p:cNvSpPr>
+            <a:spLocks noGrp="1"/>
+          </p:cNvSpPr>
+          <p:nvPr>
+            <p:ph idx="1"/>
+          </p:nvPr>
+        </p:nvSpPr>
+        <p:spPr/>
+        <p:txBody>
+          <a:bodyPr/>
+          <a:lstStyle/>
+          <a:p>
+            <a:r>
+              <a:rPr lang="en-US" dirty="0"/>
+              <a:t>Further flask API design</a:t>
+            </a:r>
+          </a:p>
+          <a:p>
+            <a:pPr lvl="1"/>
+            <a:r>
+              <a:rPr lang="en-US" dirty="0"/>
+              <a:t>Design endpoint schemas for checking the status of Notion and the DB (2 endpoints)</a:t>
+            </a:r>
+          </a:p>
+          <a:p>
+            <a:pPr lvl="1"/>
+            <a:r>
+              <a:rPr lang="en-US" dirty="0"/>
+              <a:t>Update documentation</a:t>
+            </a:r>
+          </a:p>
+          <a:p>
+            <a:pPr lvl="1"/>
+            <a:r>
+              <a:rPr lang="en-US" dirty="0"/>
+              <a:t>Implement endpoint schemas (Notion + DB)</a:t>
+            </a:r>
+          </a:p>
+        </p:txBody>
+      </p:sp>
+    </p:spTree>
+    <p:extLst>
+      <p:ext uri="{BB962C8B-B14F-4D97-AF65-F5344CB8AC3E}">
+        <p14:creationId xmlns:p14="http://schemas.microsoft.com/office/powerpoint/2010/main" val="1906549067"/>
+      </p:ext>
+    </p:extLst>
+  </p:cSld>
+  <p:clrMapOvr>
+    <a:masterClrMapping/>
+  </p:clrMapOvr>
+</p:sld>
+</file>
+
 <file path=ppt/slides/slide2.xml><?xml version="1.0" encoding="utf-8"?>
 <p:sld xmlns:a="http://schemas.openxmlformats.org/drawingml/2006/main" xmlns:r="http://schemas.openxmlformats.org/officeDocument/2006/relationships" xmlns:p="http://schemas.openxmlformats.org/presentationml/2006/main">
   <p:cSld>
@@ -3439,18 +3742,59 @@
             <p:ph type="title"/>
           </p:nvPr>
         </p:nvSpPr>
-        <p:spPr/>
+        <p:spPr>
+          <a:xfrm>
+            <a:off x="364669" y="0"/>
+            <a:ext cx="10515600" cy="707923"/>
+          </a:xfrm>
+        </p:spPr>
         <p:txBody>
           <a:bodyPr/>
           <a:lstStyle/>
           <a:p>
             <a:r>
               <a:rPr lang="en-US" dirty="0"/>
-              <a:t>Timeline – Day 4</a:t>
-            </a:r>
-          </a:p>
-        </p:txBody>
-      </p:sp>
+              <a:t>Timeline – Day 5, Sep 5</a:t>
+            </a:r>
+          </a:p>
+        </p:txBody>
+      </p:sp>
+      <p:pic>
+        <p:nvPicPr>
+          <p:cNvPr id="6" name="Picture 5" descr="A schedule of a rough schedule">
+            <a:extLst>
+              <a:ext uri="{FF2B5EF4-FFF2-40B4-BE49-F238E27FC236}">
+                <a16:creationId xmlns:a16="http://schemas.microsoft.com/office/drawing/2014/main" id="{C9BC8AD4-5936-6899-E8AE-BDB331253D53}"/>
+              </a:ext>
+            </a:extLst>
+          </p:cNvPr>
+          <p:cNvPicPr>
+            <a:picLocks noChangeAspect="1"/>
+          </p:cNvPicPr>
+          <p:nvPr/>
+        </p:nvPicPr>
+        <p:blipFill>
+          <a:blip r:embed="rId2">
+            <a:extLst>
+              <a:ext uri="{28A0092B-C50C-407E-A947-70E740481C1C}">
+                <a14:useLocalDpi xmlns:a14="http://schemas.microsoft.com/office/drawing/2010/main" val="0"/>
+              </a:ext>
+            </a:extLst>
+          </a:blip>
+          <a:stretch>
+            <a:fillRect/>
+          </a:stretch>
+        </p:blipFill>
+        <p:spPr>
+          <a:xfrm>
+            <a:off x="172692" y="707923"/>
+            <a:ext cx="11822663" cy="5951590"/>
+          </a:xfrm>
+          <a:prstGeom prst="rect">
+            <a:avLst/>
+          </a:prstGeom>
+        </p:spPr>
+      </p:pic>
     </p:spTree>
     <p:extLst>
       <p:ext uri="{BB962C8B-B14F-4D97-AF65-F5344CB8AC3E}">
@@ -3525,10 +3869,99 @@
             <p:ph idx="1"/>
           </p:nvPr>
         </p:nvSpPr>
-        <p:spPr/>
-        <p:txBody>
-          <a:bodyPr/>
-          <a:lstStyle/>
+        <p:spPr>
+          <a:xfrm>
+            <a:off x="838200" y="1376516"/>
+            <a:ext cx="10515600" cy="5481484"/>
+          </a:xfrm>
+        </p:spPr>
+        <p:txBody>
+          <a:bodyPr>
+            <a:normAutofit lnSpcReduction="10000"/>
+          </a:bodyPr>
+          <a:lstStyle/>
+          <a:p>
+            <a:r>
+              <a:rPr lang="en-US" dirty="0"/>
+              <a:t>Estimated end date: Oct 13 (~ 1 month)</a:t>
+            </a:r>
+          </a:p>
+          <a:p>
+            <a:r>
+              <a:rPr lang="en-US" dirty="0"/>
+              <a:t>Completed: Database Setup, Backend Setup, Intro to Flask</a:t>
+            </a:r>
+          </a:p>
+          <a:p>
+            <a:r>
+              <a:rPr lang="en-US" dirty="0"/>
+              <a:t>Progress feels slow</a:t>
+            </a:r>
+          </a:p>
+          <a:p>
+            <a:r>
+              <a:rPr lang="en-US" dirty="0"/>
+              <a:t>Rest of this sprint:</a:t>
+            </a:r>
+          </a:p>
+          <a:p>
+            <a:pPr lvl="1"/>
+            <a:r>
+              <a:rPr lang="en-US" dirty="0"/>
+              <a:t>Finish Subsystem Integration (loosely connecting everything together)</a:t>
+            </a:r>
+          </a:p>
+          <a:p>
+            <a:pPr lvl="1"/>
+            <a:r>
+              <a:rPr lang="en-US" dirty="0"/>
+              <a:t>Merge everything together (Pull Request)</a:t>
+            </a:r>
+          </a:p>
+          <a:p>
+            <a:r>
+              <a:rPr lang="en-US" dirty="0"/>
+              <a:t>6 Backlog items remain</a:t>
+            </a:r>
+          </a:p>
+          <a:p>
+            <a:pPr lvl="1"/>
+            <a:r>
+              <a:rPr lang="en-US" dirty="0"/>
+              <a:t>1 is already being addressed (Subsystem Integration)</a:t>
+            </a:r>
+          </a:p>
+          <a:p>
+            <a:pPr lvl="1"/>
+            <a:r>
+              <a:rPr lang="en-US" dirty="0"/>
+              <a:t>2 Main Features left to implement</a:t>
+            </a:r>
+          </a:p>
+          <a:p>
+            <a:pPr lvl="2"/>
+            <a:r>
+              <a:rPr lang="en-US" dirty="0"/>
+              <a:t>Submitting Plan (sending data to productivity app Notion)</a:t>
+            </a:r>
+          </a:p>
+          <a:p>
+            <a:pPr lvl="2"/>
+            <a:r>
+              <a:rPr lang="en-US" dirty="0"/>
+              <a:t>Feedback System</a:t>
+            </a:r>
+          </a:p>
+          <a:p>
+            <a:pPr lvl="1"/>
+            <a:r>
+              <a:rPr lang="en-US" dirty="0"/>
+              <a:t>Last 3: testing, documenting, and making things presentable for employers</a:t>
+            </a:r>
+          </a:p>
+          <a:p>
+            <a:endParaRPr lang="en-US" dirty="0"/>
+          </a:p>
           <a:p>
             <a:endParaRPr lang="en-US" dirty="0"/>
           </a:p>
@@ -3569,7 +4002,7 @@
           <p:cNvPr id="2" name="Title 1">
             <a:extLst>
               <a:ext uri="{FF2B5EF4-FFF2-40B4-BE49-F238E27FC236}">
-                <a16:creationId xmlns:a16="http://schemas.microsoft.com/office/drawing/2014/main" id="{0D605B24-BC15-FBA5-CA2A-42BDC57095A1}"/>
+                <a16:creationId xmlns:a16="http://schemas.microsoft.com/office/drawing/2014/main" id="{4811C7D0-1DFF-3FE2-3BE3-7D5C76B35895}"/>
               </a:ext>
             </a:extLst>
           </p:cNvPr>
@@ -3587,40 +4020,47 @@
           <a:p>
             <a:r>
               <a:rPr lang="en-US" dirty="0"/>
-              <a:t>Previous Progress</a:t>
-            </a:r>
-          </a:p>
-        </p:txBody>
-      </p:sp>
-      <p:sp>
-        <p:nvSpPr>
-          <p:cNvPr id="3" name="Content Placeholder 2">
-            <a:extLst>
-              <a:ext uri="{FF2B5EF4-FFF2-40B4-BE49-F238E27FC236}">
-                <a16:creationId xmlns:a16="http://schemas.microsoft.com/office/drawing/2014/main" id="{CA89C19A-9A1A-B89D-7296-7F238C3EFC27}"/>
-              </a:ext>
-            </a:extLst>
-          </p:cNvPr>
-          <p:cNvSpPr>
-            <a:spLocks noGrp="1"/>
-          </p:cNvSpPr>
+              <a:t>Final Stretch Snapshot</a:t>
+            </a:r>
+          </a:p>
+        </p:txBody>
+      </p:sp>
+      <p:pic>
+        <p:nvPicPr>
+          <p:cNvPr id="5" name="Content Placeholder 4">
+            <a:extLst>
+              <a:ext uri="{FF2B5EF4-FFF2-40B4-BE49-F238E27FC236}">
+                <a16:creationId xmlns:a16="http://schemas.microsoft.com/office/drawing/2014/main" id="{A4AC651E-6DE1-A505-DDB0-9098BA56358F}"/>
+              </a:ext>
+            </a:extLst>
+          </p:cNvPr>
+          <p:cNvPicPr>
+            <a:picLocks noGrp="1" noChangeAspect="1"/>
+          </p:cNvPicPr>
           <p:nvPr>
             <p:ph idx="1"/>
           </p:nvPr>
-        </p:nvSpPr>
-        <p:spPr/>
-        <p:txBody>
-          <a:bodyPr/>
-          <a:lstStyle/>
-          <a:p>
-            <a:endParaRPr lang="en-US"/>
-          </a:p>
-        </p:txBody>
-      </p:sp>
+        </p:nvPicPr>
+        <p:blipFill>
+          <a:blip r:embed="rId2"/>
+          <a:stretch>
+            <a:fillRect/>
+          </a:stretch>
+        </p:blipFill>
+        <p:spPr>
+          <a:xfrm>
+            <a:off x="657644" y="1511310"/>
+            <a:ext cx="8161891" cy="4899321"/>
+          </a:xfrm>
+          <a:prstGeom prst="rect">
+            <a:avLst/>
+          </a:prstGeom>
+        </p:spPr>
+      </p:pic>
     </p:spTree>
     <p:extLst>
       <p:ext uri="{BB962C8B-B14F-4D97-AF65-F5344CB8AC3E}">
-        <p14:creationId xmlns:p14="http://schemas.microsoft.com/office/powerpoint/2010/main" val="2975136061"/>
+        <p14:creationId xmlns:p14="http://schemas.microsoft.com/office/powerpoint/2010/main" val="291461500"/>
       </p:ext>
     </p:extLst>
   </p:cSld>
@@ -3652,7 +4092,7 @@
           <p:cNvPr id="2" name="Title 1">
             <a:extLst>
               <a:ext uri="{FF2B5EF4-FFF2-40B4-BE49-F238E27FC236}">
-                <a16:creationId xmlns:a16="http://schemas.microsoft.com/office/drawing/2014/main" id="{2C25A4FD-5639-4D22-DA86-0DAC040693AE}"/>
+                <a16:creationId xmlns:a16="http://schemas.microsoft.com/office/drawing/2014/main" id="{0D605B24-BC15-FBA5-CA2A-42BDC57095A1}"/>
               </a:ext>
             </a:extLst>
           </p:cNvPr>
@@ -3670,7 +4110,7 @@
           <a:p>
             <a:r>
               <a:rPr lang="en-US" dirty="0"/>
-              <a:t>Problems &amp; Blockers</a:t>
+              <a:t>Previous Progress</a:t>
             </a:r>
           </a:p>
         </p:txBody>
@@ -3680,7 +4120,7 @@
           <p:cNvPr id="3" name="Content Placeholder 2">
             <a:extLst>
               <a:ext uri="{FF2B5EF4-FFF2-40B4-BE49-F238E27FC236}">
-                <a16:creationId xmlns:a16="http://schemas.microsoft.com/office/drawing/2014/main" id="{C83917C6-300B-A2AC-532F-B793C935FCED}"/>
+                <a16:creationId xmlns:a16="http://schemas.microsoft.com/office/drawing/2014/main" id="{CA89C19A-9A1A-B89D-7296-7F238C3EFC27}"/>
               </a:ext>
             </a:extLst>
           </p:cNvPr>
@@ -3693,17 +4133,104 @@
         </p:nvSpPr>
         <p:spPr/>
         <p:txBody>
-          <a:bodyPr/>
-          <a:lstStyle/>
-          <a:p>
-            <a:endParaRPr lang="en-US" dirty="0"/>
+          <a:bodyPr>
+            <a:normAutofit fontScale="92500" lnSpcReduction="20000"/>
+          </a:bodyPr>
+          <a:lstStyle/>
+          <a:p>
+            <a:r>
+              <a:rPr lang="en-US" dirty="0"/>
+              <a:t>Database is setup &amp; with a more efficient design</a:t>
+            </a:r>
+          </a:p>
+          <a:p>
+            <a:r>
+              <a:rPr lang="en-US" dirty="0"/>
+              <a:t>Basic backend is setup</a:t>
+            </a:r>
+          </a:p>
+          <a:p>
+            <a:pPr lvl="1"/>
+            <a:r>
+              <a:rPr lang="en-US" dirty="0"/>
+              <a:t>Two </a:t>
+            </a:r>
+            <a:r>
+              <a:rPr lang="en-US" dirty="0" err="1"/>
+              <a:t>api</a:t>
+            </a:r>
+            <a:r>
+              <a:rPr lang="en-US" dirty="0"/>
+              <a:t> endpoints developed</a:t>
+            </a:r>
+          </a:p>
+          <a:p>
+            <a:pPr lvl="2"/>
+            <a:r>
+              <a:rPr lang="en-US" dirty="0"/>
+              <a:t>Checking flask’s status</a:t>
+            </a:r>
+          </a:p>
+          <a:p>
+            <a:pPr lvl="2"/>
+            <a:r>
+              <a:rPr lang="en-US" dirty="0"/>
+              <a:t>Retrieving data and then calculating the statistical metrics</a:t>
+            </a:r>
+          </a:p>
+          <a:p>
+            <a:r>
+              <a:rPr lang="en-US" dirty="0"/>
+              <a:t>Designed + passed two basic quizzes covering concepts learned for Flask (score must be 70% or greater)</a:t>
+            </a:r>
+          </a:p>
+          <a:p>
+            <a:r>
+              <a:rPr lang="en-US" dirty="0"/>
+              <a:t>Course corrected: Subsystem Integration</a:t>
+            </a:r>
+          </a:p>
+          <a:p>
+            <a:pPr lvl="1"/>
+            <a:r>
+              <a:rPr lang="en-US" dirty="0"/>
+              <a:t>Stopped scope creep, split new ideas into new backlog items</a:t>
+            </a:r>
+          </a:p>
+          <a:p>
+            <a:pPr lvl="1"/>
+            <a:r>
+              <a:rPr lang="en-US" dirty="0"/>
+              <a:t>Labeled new backlog items as ‘extras’ in Notion</a:t>
+            </a:r>
+          </a:p>
+          <a:p>
+            <a:pPr lvl="1"/>
+            <a:r>
+              <a:rPr lang="en-US" dirty="0"/>
+              <a:t>Redefined subtasks + Definition of Done</a:t>
+            </a:r>
+          </a:p>
+          <a:p>
+            <a:r>
+              <a:rPr lang="en-US" dirty="0"/>
+              <a:t>Completed two </a:t>
+            </a:r>
+            <a:r>
+              <a:rPr lang="en-US" dirty="0" err="1"/>
+              <a:t>swimlane</a:t>
+            </a:r>
+            <a:r>
+              <a:rPr lang="en-US" dirty="0"/>
+              <a:t> diagrams – helpful for designing subsystem interactions</a:t>
+            </a:r>
           </a:p>
         </p:txBody>
       </p:sp>
     </p:spTree>
     <p:extLst>
       <p:ext uri="{BB962C8B-B14F-4D97-AF65-F5344CB8AC3E}">
-        <p14:creationId xmlns:p14="http://schemas.microsoft.com/office/powerpoint/2010/main" val="65931321"/>
+        <p14:creationId xmlns:p14="http://schemas.microsoft.com/office/powerpoint/2010/main" val="2975136061"/>
       </p:ext>
     </p:extLst>
   </p:cSld>
@@ -3714,6 +4241,1576 @@
 </file>
 
 <file path=ppt/slides/slide6.xml><?xml version="1.0" encoding="utf-8"?>
+<p:sld xmlns:a="http://schemas.openxmlformats.org/drawingml/2006/main" xmlns:r="http://schemas.openxmlformats.org/officeDocument/2006/relationships" xmlns:p="http://schemas.openxmlformats.org/presentationml/2006/main">
+  <p:cSld>
+    <p:bg>
+      <p:bgPr>
+        <a:solidFill>
+          <a:schemeClr val="bg1"/>
+        </a:solidFill>
+        <a:effectLst/>
+      </p:bgPr>
+    </p:bg>
+    <p:spTree>
+      <p:nvGrpSpPr>
+        <p:cNvPr id="1" name=""/>
+        <p:cNvGrpSpPr/>
+        <p:nvPr/>
+      </p:nvGrpSpPr>
+      <p:grpSpPr>
+        <a:xfrm>
+          <a:off x="0" y="0"/>
+          <a:ext cx="0" cy="0"/>
+          <a:chOff x="0" y="0"/>
+          <a:chExt cx="0" cy="0"/>
+        </a:xfrm>
+      </p:grpSpPr>
+      <p:sp useBgFill="1">
+        <p:nvSpPr>
+          <p:cNvPr id="12" name="Rectangle 11">
+            <a:extLst>
+              <a:ext uri="{FF2B5EF4-FFF2-40B4-BE49-F238E27FC236}">
+                <a16:creationId xmlns:a16="http://schemas.microsoft.com/office/drawing/2014/main" id="{2151139A-886F-4B97-8815-729AD3831BBD}"/>
+              </a:ext>
+              <a:ext uri="{C183D7F6-B498-43B3-948B-1728B52AA6E4}">
+                <adec:decorative xmlns:adec="http://schemas.microsoft.com/office/drawing/2017/decorative" val="1"/>
+              </a:ext>
+            </a:extLst>
+          </p:cNvPr>
+          <p:cNvSpPr>
+            <a:spLocks noGrp="1" noRot="1" noChangeAspect="1" noMove="1" noResize="1" noEditPoints="1" noAdjustHandles="1" noChangeArrowheads="1" noChangeShapeType="1" noTextEdit="1"/>
+          </p:cNvSpPr>
+          <p:nvPr>
+            <p:extLst>
+              <p:ext uri="{386F3935-93C4-4BCD-93E2-E3B085C9AB24}">
+                <p16:designElem xmlns:p16="http://schemas.microsoft.com/office/powerpoint/2015/main" val="1"/>
+              </p:ext>
+            </p:extLst>
+          </p:nvPr>
+        </p:nvSpPr>
+        <p:spPr>
+          <a:xfrm>
+            <a:off x="0" y="0"/>
+            <a:ext cx="12192000" cy="6858000"/>
+          </a:xfrm>
+          <a:prstGeom prst="rect">
+            <a:avLst/>
+          </a:prstGeom>
+          <a:ln w="12700" cap="flat" cmpd="sng" algn="ctr">
+            <a:noFill/>
+            <a:prstDash val="solid"/>
+            <a:miter lim="800000"/>
+          </a:ln>
+          <a:effectLst/>
+          <a:extLst>
+            <a:ext uri="{91240B29-F687-4F45-9708-019B960494DF}">
+              <a14:hiddenLine xmlns:a14="http://schemas.microsoft.com/office/drawing/2010/main" w="12700" cap="flat" cmpd="sng" algn="ctr">
+                <a:solidFill>
+                  <a:schemeClr val="accent1">
+                    <a:shade val="50000"/>
+                  </a:schemeClr>
+                </a:solidFill>
+                <a:prstDash val="solid"/>
+                <a:miter lim="800000"/>
+              </a14:hiddenLine>
+            </a:ext>
+          </a:extLst>
+        </p:spPr>
+        <p:style>
+          <a:lnRef idx="2">
+            <a:schemeClr val="accent1">
+              <a:shade val="50000"/>
+            </a:schemeClr>
+          </a:lnRef>
+          <a:fillRef idx="1">
+            <a:schemeClr val="accent1"/>
+          </a:fillRef>
+          <a:effectRef idx="0">
+            <a:schemeClr val="accent1"/>
+          </a:effectRef>
+          <a:fontRef idx="minor">
+            <a:schemeClr val="lt1"/>
+          </a:fontRef>
+        </p:style>
+        <p:txBody>
+          <a:bodyPr rtlCol="0" anchor="ctr"/>
+          <a:lstStyle/>
+          <a:p>
+            <a:pPr algn="ctr"/>
+            <a:endParaRPr lang="en-US" sz="2000"/>
+          </a:p>
+        </p:txBody>
+      </p:sp>
+      <p:sp>
+        <p:nvSpPr>
+          <p:cNvPr id="14" name="Rectangle 13">
+            <a:extLst>
+              <a:ext uri="{FF2B5EF4-FFF2-40B4-BE49-F238E27FC236}">
+                <a16:creationId xmlns:a16="http://schemas.microsoft.com/office/drawing/2014/main" id="{AB5E08C4-8CDD-4623-A5B8-E998C6DEE3B7}"/>
+              </a:ext>
+              <a:ext uri="{C183D7F6-B498-43B3-948B-1728B52AA6E4}">
+                <adec:decorative xmlns:adec="http://schemas.microsoft.com/office/drawing/2017/decorative" val="1"/>
+              </a:ext>
+            </a:extLst>
+          </p:cNvPr>
+          <p:cNvSpPr>
+            <a:spLocks noGrp="1" noRot="1" noChangeAspect="1" noMove="1" noResize="1" noEditPoints="1" noAdjustHandles="1" noChangeArrowheads="1" noChangeShapeType="1" noTextEdit="1"/>
+          </p:cNvSpPr>
+          <p:nvPr>
+            <p:extLst>
+              <p:ext uri="{386F3935-93C4-4BCD-93E2-E3B085C9AB24}">
+                <p16:designElem xmlns:p16="http://schemas.microsoft.com/office/powerpoint/2015/main" val="1"/>
+              </p:ext>
+            </p:extLst>
+          </p:nvPr>
+        </p:nvSpPr>
+        <p:spPr>
+          <a:xfrm flipH="1">
+            <a:off x="2" y="492"/>
+            <a:ext cx="12191998" cy="1575955"/>
+          </a:xfrm>
+          <a:prstGeom prst="rect">
+            <a:avLst/>
+          </a:prstGeom>
+          <a:gradFill>
+            <a:gsLst>
+              <a:gs pos="0">
+                <a:schemeClr val="accent1">
+                  <a:lumMod val="50000"/>
+                </a:schemeClr>
+              </a:gs>
+              <a:gs pos="100000">
+                <a:schemeClr val="accent1">
+                  <a:lumMod val="75000"/>
+                </a:schemeClr>
+              </a:gs>
+            </a:gsLst>
+            <a:lin ang="8400000" scaled="0"/>
+          </a:gradFill>
+          <a:ln>
+            <a:noFill/>
+          </a:ln>
+        </p:spPr>
+        <p:style>
+          <a:lnRef idx="2">
+            <a:schemeClr val="accent1">
+              <a:shade val="50000"/>
+            </a:schemeClr>
+          </a:lnRef>
+          <a:fillRef idx="1">
+            <a:schemeClr val="accent1"/>
+          </a:fillRef>
+          <a:effectRef idx="0">
+            <a:schemeClr val="accent1"/>
+          </a:effectRef>
+          <a:fontRef idx="minor">
+            <a:schemeClr val="lt1"/>
+          </a:fontRef>
+        </p:style>
+        <p:txBody>
+          <a:bodyPr rtlCol="0" anchor="ctr"/>
+          <a:lstStyle/>
+          <a:p>
+            <a:pPr algn="ctr"/>
+            <a:endParaRPr lang="en-US"/>
+          </a:p>
+        </p:txBody>
+      </p:sp>
+      <p:sp>
+        <p:nvSpPr>
+          <p:cNvPr id="16" name="Rectangle 15">
+            <a:extLst>
+              <a:ext uri="{FF2B5EF4-FFF2-40B4-BE49-F238E27FC236}">
+                <a16:creationId xmlns:a16="http://schemas.microsoft.com/office/drawing/2014/main" id="{15F33878-D502-4FFA-8ACE-F2AECDB2A23F}"/>
+              </a:ext>
+              <a:ext uri="{C183D7F6-B498-43B3-948B-1728B52AA6E4}">
+                <adec:decorative xmlns:adec="http://schemas.microsoft.com/office/drawing/2017/decorative" val="1"/>
+              </a:ext>
+            </a:extLst>
+          </p:cNvPr>
+          <p:cNvSpPr>
+            <a:spLocks noGrp="1" noRot="1" noChangeAspect="1" noMove="1" noResize="1" noEditPoints="1" noAdjustHandles="1" noChangeArrowheads="1" noChangeShapeType="1" noTextEdit="1"/>
+          </p:cNvSpPr>
+          <p:nvPr>
+            <p:extLst>
+              <p:ext uri="{386F3935-93C4-4BCD-93E2-E3B085C9AB24}">
+                <p16:designElem xmlns:p16="http://schemas.microsoft.com/office/powerpoint/2015/main" val="1"/>
+              </p:ext>
+            </p:extLst>
+          </p:nvPr>
+        </p:nvSpPr>
+        <p:spPr>
+          <a:xfrm rot="10800000" flipH="1">
+            <a:off x="8128857" y="35"/>
+            <a:ext cx="4063143" cy="1576412"/>
+          </a:xfrm>
+          <a:prstGeom prst="rect">
+            <a:avLst/>
+          </a:prstGeom>
+          <a:gradFill>
+            <a:gsLst>
+              <a:gs pos="19000">
+                <a:schemeClr val="accent1">
+                  <a:lumMod val="50000"/>
+                  <a:alpha val="68000"/>
+                </a:schemeClr>
+              </a:gs>
+              <a:gs pos="100000">
+                <a:schemeClr val="accent1">
+                  <a:alpha val="79000"/>
+                </a:schemeClr>
+              </a:gs>
+            </a:gsLst>
+            <a:lin ang="19200000" scaled="0"/>
+          </a:gradFill>
+          <a:ln>
+            <a:noFill/>
+          </a:ln>
+        </p:spPr>
+        <p:style>
+          <a:lnRef idx="2">
+            <a:schemeClr val="accent1">
+              <a:shade val="50000"/>
+            </a:schemeClr>
+          </a:lnRef>
+          <a:fillRef idx="1">
+            <a:schemeClr val="accent1"/>
+          </a:fillRef>
+          <a:effectRef idx="0">
+            <a:schemeClr val="accent1"/>
+          </a:effectRef>
+          <a:fontRef idx="minor">
+            <a:schemeClr val="lt1"/>
+          </a:fontRef>
+        </p:style>
+        <p:txBody>
+          <a:bodyPr rtlCol="0" anchor="ctr"/>
+          <a:lstStyle/>
+          <a:p>
+            <a:pPr algn="ctr"/>
+            <a:endParaRPr lang="en-US"/>
+          </a:p>
+        </p:txBody>
+      </p:sp>
+      <p:sp>
+        <p:nvSpPr>
+          <p:cNvPr id="18" name="Rectangle 17">
+            <a:extLst>
+              <a:ext uri="{FF2B5EF4-FFF2-40B4-BE49-F238E27FC236}">
+                <a16:creationId xmlns:a16="http://schemas.microsoft.com/office/drawing/2014/main" id="{D3539FEE-81D3-4406-802E-60B20B16F4F6}"/>
+              </a:ext>
+              <a:ext uri="{C183D7F6-B498-43B3-948B-1728B52AA6E4}">
+                <adec:decorative xmlns:adec="http://schemas.microsoft.com/office/drawing/2017/decorative" val="1"/>
+              </a:ext>
+            </a:extLst>
+          </p:cNvPr>
+          <p:cNvSpPr>
+            <a:spLocks noGrp="1" noRot="1" noChangeAspect="1" noMove="1" noResize="1" noEditPoints="1" noAdjustHandles="1" noChangeArrowheads="1" noChangeShapeType="1" noTextEdit="1"/>
+          </p:cNvSpPr>
+          <p:nvPr>
+            <p:extLst>
+              <p:ext uri="{386F3935-93C4-4BCD-93E2-E3B085C9AB24}">
+                <p16:designElem xmlns:p16="http://schemas.microsoft.com/office/powerpoint/2015/main" val="1"/>
+              </p:ext>
+            </p:extLst>
+          </p:nvPr>
+        </p:nvSpPr>
+        <p:spPr>
+          <a:xfrm rot="5400000">
+            <a:off x="5307778" y="-5307777"/>
+            <a:ext cx="1576446" cy="12192001"/>
+          </a:xfrm>
+          <a:prstGeom prst="rect">
+            <a:avLst/>
+          </a:prstGeom>
+          <a:gradFill>
+            <a:gsLst>
+              <a:gs pos="16000">
+                <a:srgbClr val="000000">
+                  <a:alpha val="0"/>
+                </a:srgbClr>
+              </a:gs>
+              <a:gs pos="99000">
+                <a:srgbClr val="000000">
+                  <a:alpha val="87000"/>
+                </a:srgbClr>
+              </a:gs>
+            </a:gsLst>
+            <a:lin ang="11400000" scaled="0"/>
+          </a:gradFill>
+          <a:ln>
+            <a:noFill/>
+          </a:ln>
+        </p:spPr>
+        <p:style>
+          <a:lnRef idx="2">
+            <a:schemeClr val="accent1">
+              <a:shade val="50000"/>
+            </a:schemeClr>
+          </a:lnRef>
+          <a:fillRef idx="1">
+            <a:schemeClr val="accent1"/>
+          </a:fillRef>
+          <a:effectRef idx="0">
+            <a:schemeClr val="accent1"/>
+          </a:effectRef>
+          <a:fontRef idx="minor">
+            <a:schemeClr val="lt1"/>
+          </a:fontRef>
+        </p:style>
+        <p:txBody>
+          <a:bodyPr rtlCol="0" anchor="ctr"/>
+          <a:lstStyle/>
+          <a:p>
+            <a:pPr algn="ctr"/>
+            <a:endParaRPr lang="en-US" dirty="0"/>
+          </a:p>
+        </p:txBody>
+      </p:sp>
+      <p:sp>
+        <p:nvSpPr>
+          <p:cNvPr id="20" name="Rectangle 19">
+            <a:extLst>
+              <a:ext uri="{FF2B5EF4-FFF2-40B4-BE49-F238E27FC236}">
+                <a16:creationId xmlns:a16="http://schemas.microsoft.com/office/drawing/2014/main" id="{DC701763-729E-462F-A5A8-E0DEFEB1E2E4}"/>
+              </a:ext>
+              <a:ext uri="{C183D7F6-B498-43B3-948B-1728B52AA6E4}">
+                <adec:decorative xmlns:adec="http://schemas.microsoft.com/office/drawing/2017/decorative" val="1"/>
+              </a:ext>
+            </a:extLst>
+          </p:cNvPr>
+          <p:cNvSpPr>
+            <a:spLocks noGrp="1" noRot="1" noChangeAspect="1" noMove="1" noResize="1" noEditPoints="1" noAdjustHandles="1" noChangeArrowheads="1" noChangeShapeType="1" noTextEdit="1"/>
+          </p:cNvSpPr>
+          <p:nvPr>
+            <p:extLst>
+              <p:ext uri="{386F3935-93C4-4BCD-93E2-E3B085C9AB24}">
+                <p16:designElem xmlns:p16="http://schemas.microsoft.com/office/powerpoint/2015/main" val="1"/>
+              </p:ext>
+            </p:extLst>
+          </p:nvPr>
+        </p:nvSpPr>
+        <p:spPr>
+          <a:xfrm>
+            <a:off x="3825434" y="986"/>
+            <a:ext cx="4303422" cy="1575461"/>
+          </a:xfrm>
+          <a:prstGeom prst="rect">
+            <a:avLst/>
+          </a:prstGeom>
+          <a:gradFill>
+            <a:gsLst>
+              <a:gs pos="0">
+                <a:schemeClr val="accent1">
+                  <a:alpha val="17000"/>
+                </a:schemeClr>
+              </a:gs>
+              <a:gs pos="74000">
+                <a:schemeClr val="accent1">
+                  <a:lumMod val="50000"/>
+                  <a:alpha val="0"/>
+                </a:schemeClr>
+              </a:gs>
+            </a:gsLst>
+            <a:lin ang="14400000" scaled="0"/>
+          </a:gradFill>
+          <a:ln>
+            <a:noFill/>
+          </a:ln>
+        </p:spPr>
+        <p:style>
+          <a:lnRef idx="2">
+            <a:schemeClr val="accent1">
+              <a:shade val="50000"/>
+            </a:schemeClr>
+          </a:lnRef>
+          <a:fillRef idx="1">
+            <a:schemeClr val="accent1"/>
+          </a:fillRef>
+          <a:effectRef idx="0">
+            <a:schemeClr val="accent1"/>
+          </a:effectRef>
+          <a:fontRef idx="minor">
+            <a:schemeClr val="lt1"/>
+          </a:fontRef>
+        </p:style>
+        <p:txBody>
+          <a:bodyPr rtlCol="0" anchor="ctr"/>
+          <a:lstStyle/>
+          <a:p>
+            <a:pPr algn="ctr"/>
+            <a:endParaRPr lang="en-US"/>
+          </a:p>
+        </p:txBody>
+      </p:sp>
+      <p:sp>
+        <p:nvSpPr>
+          <p:cNvPr id="2" name="Title 1">
+            <a:extLst>
+              <a:ext uri="{FF2B5EF4-FFF2-40B4-BE49-F238E27FC236}">
+                <a16:creationId xmlns:a16="http://schemas.microsoft.com/office/drawing/2014/main" id="{DCC6E962-D62F-4EDE-72C4-571202280D85}"/>
+              </a:ext>
+            </a:extLst>
+          </p:cNvPr>
+          <p:cNvSpPr>
+            <a:spLocks noGrp="1"/>
+          </p:cNvSpPr>
+          <p:nvPr>
+            <p:ph type="title"/>
+          </p:nvPr>
+        </p:nvSpPr>
+        <p:spPr>
+          <a:xfrm>
+            <a:off x="699714" y="353160"/>
+            <a:ext cx="7091300" cy="898581"/>
+          </a:xfrm>
+        </p:spPr>
+        <p:txBody>
+          <a:bodyPr vert="horz" lIns="91440" tIns="45720" rIns="91440" bIns="45720" rtlCol="0" anchor="ctr">
+            <a:normAutofit/>
+          </a:bodyPr>
+          <a:lstStyle/>
+          <a:p>
+            <a:r>
+              <a:rPr lang="en-US" sz="4000">
+                <a:solidFill>
+                  <a:srgbClr val="FFFFFF"/>
+                </a:solidFill>
+              </a:rPr>
+              <a:t>Database Schema Changes</a:t>
+            </a:r>
+          </a:p>
+        </p:txBody>
+      </p:sp>
+      <p:pic>
+        <p:nvPicPr>
+          <p:cNvPr id="5" name="Picture 4" descr="A screenshot of a computer&#10;&#10;AI-generated content may be incorrect.">
+            <a:extLst>
+              <a:ext uri="{FF2B5EF4-FFF2-40B4-BE49-F238E27FC236}">
+                <a16:creationId xmlns:a16="http://schemas.microsoft.com/office/drawing/2014/main" id="{EF064319-CA30-D015-C717-A802A321F15B}"/>
+              </a:ext>
+            </a:extLst>
+          </p:cNvPr>
+          <p:cNvPicPr>
+            <a:picLocks noChangeAspect="1"/>
+          </p:cNvPicPr>
+          <p:nvPr/>
+        </p:nvPicPr>
+        <p:blipFill>
+          <a:blip r:embed="rId2">
+            <a:extLst>
+              <a:ext uri="{28A0092B-C50C-407E-A947-70E740481C1C}">
+                <a14:useLocalDpi xmlns:a14="http://schemas.microsoft.com/office/drawing/2010/main" val="0"/>
+              </a:ext>
+            </a:extLst>
+          </a:blip>
+          <a:stretch>
+            <a:fillRect/>
+          </a:stretch>
+        </p:blipFill>
+        <p:spPr>
+          <a:xfrm>
+            <a:off x="112149" y="2287548"/>
+            <a:ext cx="5091348" cy="4123992"/>
+          </a:xfrm>
+          <a:prstGeom prst="rect">
+            <a:avLst/>
+          </a:prstGeom>
+        </p:spPr>
+      </p:pic>
+      <p:pic>
+        <p:nvPicPr>
+          <p:cNvPr id="7" name="Picture 6" descr="A screenshot of a computer&#10;&#10;AI-generated content may be incorrect.">
+            <a:extLst>
+              <a:ext uri="{FF2B5EF4-FFF2-40B4-BE49-F238E27FC236}">
+                <a16:creationId xmlns:a16="http://schemas.microsoft.com/office/drawing/2014/main" id="{507424C3-2DEA-1C70-1CB7-17964CBDC212}"/>
+              </a:ext>
+            </a:extLst>
+          </p:cNvPr>
+          <p:cNvPicPr>
+            <a:picLocks noChangeAspect="1"/>
+          </p:cNvPicPr>
+          <p:nvPr/>
+        </p:nvPicPr>
+        <p:blipFill>
+          <a:blip r:embed="rId3">
+            <a:extLst>
+              <a:ext uri="{28A0092B-C50C-407E-A947-70E740481C1C}">
+                <a14:useLocalDpi xmlns:a14="http://schemas.microsoft.com/office/drawing/2010/main" val="0"/>
+              </a:ext>
+            </a:extLst>
+          </a:blip>
+          <a:stretch>
+            <a:fillRect/>
+          </a:stretch>
+        </p:blipFill>
+        <p:spPr>
+          <a:xfrm>
+            <a:off x="6413992" y="1928621"/>
+            <a:ext cx="4224511" cy="4841847"/>
+          </a:xfrm>
+          <a:prstGeom prst="rect">
+            <a:avLst/>
+          </a:prstGeom>
+        </p:spPr>
+      </p:pic>
+      <p:sp>
+        <p:nvSpPr>
+          <p:cNvPr id="8" name="TextBox 7">
+            <a:extLst>
+              <a:ext uri="{FF2B5EF4-FFF2-40B4-BE49-F238E27FC236}">
+                <a16:creationId xmlns:a16="http://schemas.microsoft.com/office/drawing/2014/main" id="{F285EBB5-4E45-ADD7-6988-AF20B686654E}"/>
+              </a:ext>
+            </a:extLst>
+          </p:cNvPr>
+          <p:cNvSpPr txBox="1"/>
+          <p:nvPr/>
+        </p:nvSpPr>
+        <p:spPr>
+          <a:xfrm>
+            <a:off x="432619" y="1809135"/>
+            <a:ext cx="2523448" cy="369332"/>
+          </a:xfrm>
+          <a:prstGeom prst="rect">
+            <a:avLst/>
+          </a:prstGeom>
+          <a:noFill/>
+        </p:spPr>
+        <p:txBody>
+          <a:bodyPr wrap="none" rtlCol="0">
+            <a:spAutoFit/>
+          </a:bodyPr>
+          <a:lstStyle/>
+          <a:p>
+            <a:r>
+              <a:rPr lang="en-US" dirty="0"/>
+              <a:t>Old – 2NF (Bad Design!)</a:t>
+            </a:r>
+          </a:p>
+        </p:txBody>
+      </p:sp>
+      <p:sp>
+        <p:nvSpPr>
+          <p:cNvPr id="9" name="TextBox 8">
+            <a:extLst>
+              <a:ext uri="{FF2B5EF4-FFF2-40B4-BE49-F238E27FC236}">
+                <a16:creationId xmlns:a16="http://schemas.microsoft.com/office/drawing/2014/main" id="{BEA2B19D-17FF-47B7-DD5A-543D5C71F4B2}"/>
+              </a:ext>
+            </a:extLst>
+          </p:cNvPr>
+          <p:cNvSpPr txBox="1"/>
+          <p:nvPr/>
+        </p:nvSpPr>
+        <p:spPr>
+          <a:xfrm>
+            <a:off x="6381051" y="1554134"/>
+            <a:ext cx="2947987" cy="369332"/>
+          </a:xfrm>
+          <a:prstGeom prst="rect">
+            <a:avLst/>
+          </a:prstGeom>
+          <a:noFill/>
+        </p:spPr>
+        <p:txBody>
+          <a:bodyPr wrap="none" rtlCol="0">
+            <a:spAutoFit/>
+          </a:bodyPr>
+          <a:lstStyle/>
+          <a:p>
+            <a:r>
+              <a:rPr lang="en-US" dirty="0"/>
+              <a:t>New – BCNF (Good Design!)</a:t>
+            </a:r>
+          </a:p>
+        </p:txBody>
+      </p:sp>
+      <p:cxnSp>
+        <p:nvCxnSpPr>
+          <p:cNvPr id="11" name="Straight Arrow Connector 10">
+            <a:extLst>
+              <a:ext uri="{FF2B5EF4-FFF2-40B4-BE49-F238E27FC236}">
+                <a16:creationId xmlns:a16="http://schemas.microsoft.com/office/drawing/2014/main" id="{D3231326-6085-5F45-4FE3-8C6EFFBC0292}"/>
+              </a:ext>
+            </a:extLst>
+          </p:cNvPr>
+          <p:cNvCxnSpPr>
+            <a:cxnSpLocks/>
+          </p:cNvCxnSpPr>
+          <p:nvPr/>
+        </p:nvCxnSpPr>
+        <p:spPr>
+          <a:xfrm>
+            <a:off x="5319252" y="4349544"/>
+            <a:ext cx="924232" cy="0"/>
+          </a:xfrm>
+          <a:prstGeom prst="straightConnector1">
+            <a:avLst/>
+          </a:prstGeom>
+          <a:ln w="76200">
+            <a:tailEnd type="triangle"/>
+          </a:ln>
+        </p:spPr>
+        <p:style>
+          <a:lnRef idx="2">
+            <a:schemeClr val="accent1"/>
+          </a:lnRef>
+          <a:fillRef idx="0">
+            <a:schemeClr val="accent1"/>
+          </a:fillRef>
+          <a:effectRef idx="1">
+            <a:schemeClr val="accent1"/>
+          </a:effectRef>
+          <a:fontRef idx="minor">
+            <a:schemeClr val="tx1"/>
+          </a:fontRef>
+        </p:style>
+      </p:cxnSp>
+    </p:spTree>
+    <p:extLst>
+      <p:ext uri="{BB962C8B-B14F-4D97-AF65-F5344CB8AC3E}">
+        <p14:creationId xmlns:p14="http://schemas.microsoft.com/office/powerpoint/2010/main" val="4075189146"/>
+      </p:ext>
+    </p:extLst>
+  </p:cSld>
+  <p:clrMapOvr>
+    <a:masterClrMapping/>
+  </p:clrMapOvr>
+</p:sld>
+</file>
+
+<file path=ppt/slides/slide7.xml><?xml version="1.0" encoding="utf-8"?>
+<p:sld xmlns:a="http://schemas.openxmlformats.org/drawingml/2006/main" xmlns:r="http://schemas.openxmlformats.org/officeDocument/2006/relationships" xmlns:p="http://schemas.openxmlformats.org/presentationml/2006/main">
+  <p:cSld>
+    <p:bg>
+      <p:bgPr>
+        <a:solidFill>
+          <a:schemeClr val="bg1"/>
+        </a:solidFill>
+        <a:effectLst/>
+      </p:bgPr>
+    </p:bg>
+    <p:spTree>
+      <p:nvGrpSpPr>
+        <p:cNvPr id="1" name=""/>
+        <p:cNvGrpSpPr/>
+        <p:nvPr/>
+      </p:nvGrpSpPr>
+      <p:grpSpPr>
+        <a:xfrm>
+          <a:off x="0" y="0"/>
+          <a:ext cx="0" cy="0"/>
+          <a:chOff x="0" y="0"/>
+          <a:chExt cx="0" cy="0"/>
+        </a:xfrm>
+      </p:grpSpPr>
+      <p:sp useBgFill="1">
+        <p:nvSpPr>
+          <p:cNvPr id="24" name="Rectangle 23">
+            <a:extLst>
+              <a:ext uri="{FF2B5EF4-FFF2-40B4-BE49-F238E27FC236}">
+                <a16:creationId xmlns:a16="http://schemas.microsoft.com/office/drawing/2014/main" id="{A8384FB5-9ADC-4DDC-881B-597D56F5B15D}"/>
+              </a:ext>
+              <a:ext uri="{C183D7F6-B498-43B3-948B-1728B52AA6E4}">
+                <adec:decorative xmlns:adec="http://schemas.microsoft.com/office/drawing/2017/decorative" val="1"/>
+              </a:ext>
+            </a:extLst>
+          </p:cNvPr>
+          <p:cNvSpPr>
+            <a:spLocks noGrp="1" noRot="1" noChangeAspect="1" noMove="1" noResize="1" noEditPoints="1" noAdjustHandles="1" noChangeArrowheads="1" noChangeShapeType="1" noTextEdit="1"/>
+          </p:cNvSpPr>
+          <p:nvPr>
+            <p:extLst>
+              <p:ext uri="{386F3935-93C4-4BCD-93E2-E3B085C9AB24}">
+                <p16:designElem xmlns:p16="http://schemas.microsoft.com/office/powerpoint/2015/main" val="1"/>
+              </p:ext>
+            </p:extLst>
+          </p:nvPr>
+        </p:nvSpPr>
+        <p:spPr>
+          <a:xfrm>
+            <a:off x="0" y="0"/>
+            <a:ext cx="12192000" cy="6858000"/>
+          </a:xfrm>
+          <a:prstGeom prst="rect">
+            <a:avLst/>
+          </a:prstGeom>
+          <a:ln w="12700" cap="flat" cmpd="sng" algn="ctr">
+            <a:noFill/>
+            <a:prstDash val="solid"/>
+            <a:miter lim="800000"/>
+          </a:ln>
+          <a:effectLst/>
+          <a:extLst>
+            <a:ext uri="{91240B29-F687-4F45-9708-019B960494DF}">
+              <a14:hiddenLine xmlns:a14="http://schemas.microsoft.com/office/drawing/2010/main" w="12700" cap="flat" cmpd="sng" algn="ctr">
+                <a:solidFill>
+                  <a:schemeClr val="accent1">
+                    <a:shade val="50000"/>
+                  </a:schemeClr>
+                </a:solidFill>
+                <a:prstDash val="solid"/>
+                <a:miter lim="800000"/>
+              </a14:hiddenLine>
+            </a:ext>
+          </a:extLst>
+        </p:spPr>
+        <p:style>
+          <a:lnRef idx="2">
+            <a:schemeClr val="accent1">
+              <a:shade val="50000"/>
+            </a:schemeClr>
+          </a:lnRef>
+          <a:fillRef idx="1">
+            <a:schemeClr val="accent1"/>
+          </a:fillRef>
+          <a:effectRef idx="0">
+            <a:schemeClr val="accent1"/>
+          </a:effectRef>
+          <a:fontRef idx="minor">
+            <a:schemeClr val="lt1"/>
+          </a:fontRef>
+        </p:style>
+        <p:txBody>
+          <a:bodyPr rtlCol="0" anchor="ctr"/>
+          <a:lstStyle/>
+          <a:p>
+            <a:pPr algn="ctr"/>
+            <a:endParaRPr lang="en-US"/>
+          </a:p>
+        </p:txBody>
+      </p:sp>
+      <p:sp>
+        <p:nvSpPr>
+          <p:cNvPr id="26" name="Rectangle 25">
+            <a:extLst>
+              <a:ext uri="{FF2B5EF4-FFF2-40B4-BE49-F238E27FC236}">
+                <a16:creationId xmlns:a16="http://schemas.microsoft.com/office/drawing/2014/main" id="{1199E1B1-A8C0-4FE8-A5A8-1CB41D69F857}"/>
+              </a:ext>
+              <a:ext uri="{C183D7F6-B498-43B3-948B-1728B52AA6E4}">
+                <adec:decorative xmlns:adec="http://schemas.microsoft.com/office/drawing/2017/decorative" val="1"/>
+              </a:ext>
+            </a:extLst>
+          </p:cNvPr>
+          <p:cNvSpPr>
+            <a:spLocks noGrp="1" noRot="1" noChangeAspect="1" noMove="1" noResize="1" noEditPoints="1" noAdjustHandles="1" noChangeArrowheads="1" noChangeShapeType="1" noTextEdit="1"/>
+          </p:cNvSpPr>
+          <p:nvPr>
+            <p:extLst>
+              <p:ext uri="{386F3935-93C4-4BCD-93E2-E3B085C9AB24}">
+                <p16:designElem xmlns:p16="http://schemas.microsoft.com/office/powerpoint/2015/main" val="1"/>
+              </p:ext>
+            </p:extLst>
+          </p:nvPr>
+        </p:nvSpPr>
+        <p:spPr>
+          <a:xfrm rot="10800000" flipH="1">
+            <a:off x="2" y="0"/>
+            <a:ext cx="12191998" cy="1575955"/>
+          </a:xfrm>
+          <a:prstGeom prst="rect">
+            <a:avLst/>
+          </a:prstGeom>
+          <a:gradFill>
+            <a:gsLst>
+              <a:gs pos="0">
+                <a:srgbClr val="000000">
+                  <a:alpha val="96000"/>
+                </a:srgbClr>
+              </a:gs>
+              <a:gs pos="100000">
+                <a:schemeClr val="accent1">
+                  <a:lumMod val="75000"/>
+                </a:schemeClr>
+              </a:gs>
+            </a:gsLst>
+            <a:lin ang="6000000" scaled="0"/>
+          </a:gradFill>
+          <a:ln>
+            <a:noFill/>
+          </a:ln>
+        </p:spPr>
+        <p:style>
+          <a:lnRef idx="2">
+            <a:schemeClr val="accent1">
+              <a:shade val="50000"/>
+            </a:schemeClr>
+          </a:lnRef>
+          <a:fillRef idx="1">
+            <a:schemeClr val="accent1"/>
+          </a:fillRef>
+          <a:effectRef idx="0">
+            <a:schemeClr val="accent1"/>
+          </a:effectRef>
+          <a:fontRef idx="minor">
+            <a:schemeClr val="lt1"/>
+          </a:fontRef>
+        </p:style>
+        <p:txBody>
+          <a:bodyPr rtlCol="0" anchor="ctr"/>
+          <a:lstStyle/>
+          <a:p>
+            <a:pPr algn="ctr"/>
+            <a:endParaRPr lang="en-US"/>
+          </a:p>
+        </p:txBody>
+      </p:sp>
+      <p:sp>
+        <p:nvSpPr>
+          <p:cNvPr id="28" name="Rectangle 27">
+            <a:extLst>
+              <a:ext uri="{FF2B5EF4-FFF2-40B4-BE49-F238E27FC236}">
+                <a16:creationId xmlns:a16="http://schemas.microsoft.com/office/drawing/2014/main" id="{84A8DE83-DE75-4B41-9DB4-A7EC0B0DEC0B}"/>
+              </a:ext>
+              <a:ext uri="{C183D7F6-B498-43B3-948B-1728B52AA6E4}">
+                <adec:decorative xmlns:adec="http://schemas.microsoft.com/office/drawing/2017/decorative" val="1"/>
+              </a:ext>
+            </a:extLst>
+          </p:cNvPr>
+          <p:cNvSpPr>
+            <a:spLocks noGrp="1" noRot="1" noChangeAspect="1" noMove="1" noResize="1" noEditPoints="1" noAdjustHandles="1" noChangeArrowheads="1" noChangeShapeType="1" noTextEdit="1"/>
+          </p:cNvSpPr>
+          <p:nvPr>
+            <p:extLst>
+              <p:ext uri="{386F3935-93C4-4BCD-93E2-E3B085C9AB24}">
+                <p16:designElem xmlns:p16="http://schemas.microsoft.com/office/powerpoint/2015/main" val="1"/>
+              </p:ext>
+            </p:extLst>
+          </p:nvPr>
+        </p:nvSpPr>
+        <p:spPr>
+          <a:xfrm>
+            <a:off x="0" y="0"/>
+            <a:ext cx="8128856" cy="1575461"/>
+          </a:xfrm>
+          <a:prstGeom prst="rect">
+            <a:avLst/>
+          </a:prstGeom>
+          <a:gradFill>
+            <a:gsLst>
+              <a:gs pos="0">
+                <a:schemeClr val="accent1">
+                  <a:alpha val="41000"/>
+                </a:schemeClr>
+              </a:gs>
+              <a:gs pos="74000">
+                <a:schemeClr val="accent1">
+                  <a:lumMod val="60000"/>
+                  <a:lumOff val="40000"/>
+                  <a:alpha val="0"/>
+                </a:schemeClr>
+              </a:gs>
+            </a:gsLst>
+            <a:lin ang="8400000" scaled="0"/>
+          </a:gradFill>
+          <a:ln>
+            <a:noFill/>
+          </a:ln>
+        </p:spPr>
+        <p:style>
+          <a:lnRef idx="2">
+            <a:schemeClr val="accent1">
+              <a:shade val="50000"/>
+            </a:schemeClr>
+          </a:lnRef>
+          <a:fillRef idx="1">
+            <a:schemeClr val="accent1"/>
+          </a:fillRef>
+          <a:effectRef idx="0">
+            <a:schemeClr val="accent1"/>
+          </a:effectRef>
+          <a:fontRef idx="minor">
+            <a:schemeClr val="lt1"/>
+          </a:fontRef>
+        </p:style>
+        <p:txBody>
+          <a:bodyPr rtlCol="0" anchor="ctr"/>
+          <a:lstStyle/>
+          <a:p>
+            <a:pPr algn="ctr"/>
+            <a:endParaRPr lang="en-US"/>
+          </a:p>
+        </p:txBody>
+      </p:sp>
+      <p:sp>
+        <p:nvSpPr>
+          <p:cNvPr id="30" name="Rectangle 29">
+            <a:extLst>
+              <a:ext uri="{FF2B5EF4-FFF2-40B4-BE49-F238E27FC236}">
+                <a16:creationId xmlns:a16="http://schemas.microsoft.com/office/drawing/2014/main" id="{A7009A0A-BEF5-4EAC-AF15-E4F9F002E239}"/>
+              </a:ext>
+              <a:ext uri="{C183D7F6-B498-43B3-948B-1728B52AA6E4}">
+                <adec:decorative xmlns:adec="http://schemas.microsoft.com/office/drawing/2017/decorative" val="1"/>
+              </a:ext>
+            </a:extLst>
+          </p:cNvPr>
+          <p:cNvSpPr>
+            <a:spLocks noGrp="1" noRot="1" noChangeAspect="1" noMove="1" noResize="1" noEditPoints="1" noAdjustHandles="1" noChangeArrowheads="1" noChangeShapeType="1" noTextEdit="1"/>
+          </p:cNvSpPr>
+          <p:nvPr>
+            <p:extLst>
+              <p:ext uri="{386F3935-93C4-4BCD-93E2-E3B085C9AB24}">
+                <p16:designElem xmlns:p16="http://schemas.microsoft.com/office/powerpoint/2015/main" val="1"/>
+              </p:ext>
+            </p:extLst>
+          </p:nvPr>
+        </p:nvSpPr>
+        <p:spPr>
+          <a:xfrm flipH="1">
+            <a:off x="-3" y="-1"/>
+            <a:ext cx="12192002" cy="1574311"/>
+          </a:xfrm>
+          <a:prstGeom prst="rect">
+            <a:avLst/>
+          </a:prstGeom>
+          <a:gradFill>
+            <a:gsLst>
+              <a:gs pos="0">
+                <a:srgbClr val="000000">
+                  <a:alpha val="63000"/>
+                </a:srgbClr>
+              </a:gs>
+              <a:gs pos="78000">
+                <a:schemeClr val="accent1">
+                  <a:alpha val="15000"/>
+                </a:schemeClr>
+              </a:gs>
+            </a:gsLst>
+            <a:lin ang="15600000" scaled="0"/>
+          </a:gradFill>
+          <a:ln>
+            <a:noFill/>
+          </a:ln>
+        </p:spPr>
+        <p:style>
+          <a:lnRef idx="2">
+            <a:schemeClr val="accent1">
+              <a:shade val="50000"/>
+            </a:schemeClr>
+          </a:lnRef>
+          <a:fillRef idx="1">
+            <a:schemeClr val="accent1"/>
+          </a:fillRef>
+          <a:effectRef idx="0">
+            <a:schemeClr val="accent1"/>
+          </a:effectRef>
+          <a:fontRef idx="minor">
+            <a:schemeClr val="lt1"/>
+          </a:fontRef>
+        </p:style>
+        <p:txBody>
+          <a:bodyPr rtlCol="0" anchor="ctr"/>
+          <a:lstStyle/>
+          <a:p>
+            <a:pPr algn="ctr"/>
+            <a:endParaRPr lang="en-US"/>
+          </a:p>
+        </p:txBody>
+      </p:sp>
+      <p:sp>
+        <p:nvSpPr>
+          <p:cNvPr id="2" name="Title 1">
+            <a:extLst>
+              <a:ext uri="{FF2B5EF4-FFF2-40B4-BE49-F238E27FC236}">
+                <a16:creationId xmlns:a16="http://schemas.microsoft.com/office/drawing/2014/main" id="{E36C3397-1FFC-9E3F-ED97-79246CB84442}"/>
+              </a:ext>
+            </a:extLst>
+          </p:cNvPr>
+          <p:cNvSpPr>
+            <a:spLocks noGrp="1"/>
+          </p:cNvSpPr>
+          <p:nvPr>
+            <p:ph type="title"/>
+          </p:nvPr>
+        </p:nvSpPr>
+        <p:spPr>
+          <a:xfrm>
+            <a:off x="699713" y="248038"/>
+            <a:ext cx="7063721" cy="1159200"/>
+          </a:xfrm>
+        </p:spPr>
+        <p:txBody>
+          <a:bodyPr vert="horz" lIns="91440" tIns="45720" rIns="91440" bIns="45720" rtlCol="0" anchor="ctr">
+            <a:normAutofit/>
+          </a:bodyPr>
+          <a:lstStyle/>
+          <a:p>
+            <a:r>
+              <a:rPr lang="en-US" sz="3700" kern="1200" dirty="0">
+                <a:solidFill>
+                  <a:srgbClr val="FFFFFF"/>
+                </a:solidFill>
+                <a:latin typeface="+mj-lt"/>
+                <a:ea typeface="+mj-ea"/>
+                <a:cs typeface="+mj-cs"/>
+              </a:rPr>
+              <a:t>Swimlane: System Startup Process</a:t>
+            </a:r>
+          </a:p>
+        </p:txBody>
+      </p:sp>
+      <p:sp>
+        <p:nvSpPr>
+          <p:cNvPr id="9" name="TextBox 8">
+            <a:extLst>
+              <a:ext uri="{FF2B5EF4-FFF2-40B4-BE49-F238E27FC236}">
+                <a16:creationId xmlns:a16="http://schemas.microsoft.com/office/drawing/2014/main" id="{7FA66933-5C65-AC39-F1ED-4B5CFFC1123A}"/>
+              </a:ext>
+            </a:extLst>
+          </p:cNvPr>
+          <p:cNvSpPr txBox="1"/>
+          <p:nvPr/>
+        </p:nvSpPr>
+        <p:spPr>
+          <a:xfrm>
+            <a:off x="8572499" y="390832"/>
+            <a:ext cx="3233585" cy="873612"/>
+          </a:xfrm>
+          <a:prstGeom prst="rect">
+            <a:avLst/>
+          </a:prstGeom>
+        </p:spPr>
+        <p:txBody>
+          <a:bodyPr vert="horz" lIns="91440" tIns="45720" rIns="91440" bIns="45720" rtlCol="0" anchor="ctr">
+            <a:normAutofit/>
+          </a:bodyPr>
+          <a:lstStyle/>
+          <a:p>
+            <a:pPr>
+              <a:lnSpc>
+                <a:spcPct val="90000"/>
+              </a:lnSpc>
+              <a:spcBef>
+                <a:spcPts val="1000"/>
+              </a:spcBef>
+            </a:pPr>
+            <a:r>
+              <a:rPr lang="en-US" sz="1700" kern="1200" dirty="0">
+                <a:solidFill>
+                  <a:srgbClr val="FFFFFF"/>
+                </a:solidFill>
+                <a:latin typeface="+mn-lt"/>
+                <a:ea typeface="+mn-ea"/>
+                <a:cs typeface="+mn-cs"/>
+              </a:rPr>
+              <a:t>https://whimsical.com/startup-swimlane-FXvXxEvpwPnJtbe8F2VApu</a:t>
+            </a:r>
+          </a:p>
+        </p:txBody>
+      </p:sp>
+      <p:pic>
+        <p:nvPicPr>
+          <p:cNvPr id="8" name="Content Placeholder 4" descr="A diagram of a company">
+            <a:extLst>
+              <a:ext uri="{FF2B5EF4-FFF2-40B4-BE49-F238E27FC236}">
+                <a16:creationId xmlns:a16="http://schemas.microsoft.com/office/drawing/2014/main" id="{AC048508-2A01-194A-E9A1-12CA4D3A72F3}"/>
+              </a:ext>
+            </a:extLst>
+          </p:cNvPr>
+          <p:cNvPicPr>
+            <a:picLocks noGrp="1" noChangeAspect="1"/>
+          </p:cNvPicPr>
+          <p:nvPr>
+            <p:ph idx="1"/>
+          </p:nvPr>
+        </p:nvPicPr>
+        <p:blipFill>
+          <a:blip r:embed="rId2">
+            <a:extLst>
+              <a:ext uri="{28A0092B-C50C-407E-A947-70E740481C1C}">
+                <a14:useLocalDpi xmlns:a14="http://schemas.microsoft.com/office/drawing/2010/main" val="0"/>
+              </a:ext>
+            </a:extLst>
+          </a:blip>
+          <a:stretch>
+            <a:fillRect/>
+          </a:stretch>
+        </p:blipFill>
+        <p:spPr>
+          <a:xfrm>
+            <a:off x="432225" y="2408283"/>
+            <a:ext cx="11327549" cy="3568179"/>
+          </a:xfrm>
+          <a:prstGeom prst="rect">
+            <a:avLst/>
+          </a:prstGeom>
+        </p:spPr>
+      </p:pic>
+    </p:spTree>
+    <p:extLst>
+      <p:ext uri="{BB962C8B-B14F-4D97-AF65-F5344CB8AC3E}">
+        <p14:creationId xmlns:p14="http://schemas.microsoft.com/office/powerpoint/2010/main" val="1536496408"/>
+      </p:ext>
+    </p:extLst>
+  </p:cSld>
+  <p:clrMapOvr>
+    <a:masterClrMapping/>
+  </p:clrMapOvr>
+</p:sld>
+</file>
+
+<file path=ppt/slides/slide8.xml><?xml version="1.0" encoding="utf-8"?>
+<p:sld xmlns:a="http://schemas.openxmlformats.org/drawingml/2006/main" xmlns:r="http://schemas.openxmlformats.org/officeDocument/2006/relationships" xmlns:p="http://schemas.openxmlformats.org/presentationml/2006/main">
+  <p:cSld>
+    <p:bg>
+      <p:bgPr>
+        <a:solidFill>
+          <a:schemeClr val="bg1"/>
+        </a:solidFill>
+        <a:effectLst/>
+      </p:bgPr>
+    </p:bg>
+    <p:spTree>
+      <p:nvGrpSpPr>
+        <p:cNvPr id="1" name=""/>
+        <p:cNvGrpSpPr/>
+        <p:nvPr/>
+      </p:nvGrpSpPr>
+      <p:grpSpPr>
+        <a:xfrm>
+          <a:off x="0" y="0"/>
+          <a:ext cx="0" cy="0"/>
+          <a:chOff x="0" y="0"/>
+          <a:chExt cx="0" cy="0"/>
+        </a:xfrm>
+      </p:grpSpPr>
+      <p:sp useBgFill="1">
+        <p:nvSpPr>
+          <p:cNvPr id="21" name="Rectangle 20">
+            <a:extLst>
+              <a:ext uri="{FF2B5EF4-FFF2-40B4-BE49-F238E27FC236}">
+                <a16:creationId xmlns:a16="http://schemas.microsoft.com/office/drawing/2014/main" id="{A8384FB5-9ADC-4DDC-881B-597D56F5B15D}"/>
+              </a:ext>
+              <a:ext uri="{C183D7F6-B498-43B3-948B-1728B52AA6E4}">
+                <adec:decorative xmlns:adec="http://schemas.microsoft.com/office/drawing/2017/decorative" val="1"/>
+              </a:ext>
+            </a:extLst>
+          </p:cNvPr>
+          <p:cNvSpPr>
+            <a:spLocks noGrp="1" noRot="1" noChangeAspect="1" noMove="1" noResize="1" noEditPoints="1" noAdjustHandles="1" noChangeArrowheads="1" noChangeShapeType="1" noTextEdit="1"/>
+          </p:cNvSpPr>
+          <p:nvPr>
+            <p:extLst>
+              <p:ext uri="{386F3935-93C4-4BCD-93E2-E3B085C9AB24}">
+                <p16:designElem xmlns:p16="http://schemas.microsoft.com/office/powerpoint/2015/main" val="1"/>
+              </p:ext>
+            </p:extLst>
+          </p:nvPr>
+        </p:nvSpPr>
+        <p:spPr>
+          <a:xfrm>
+            <a:off x="0" y="0"/>
+            <a:ext cx="12192000" cy="6858000"/>
+          </a:xfrm>
+          <a:prstGeom prst="rect">
+            <a:avLst/>
+          </a:prstGeom>
+          <a:ln w="12700" cap="flat" cmpd="sng" algn="ctr">
+            <a:noFill/>
+            <a:prstDash val="solid"/>
+            <a:miter lim="800000"/>
+          </a:ln>
+          <a:effectLst/>
+          <a:extLst>
+            <a:ext uri="{91240B29-F687-4F45-9708-019B960494DF}">
+              <a14:hiddenLine xmlns:a14="http://schemas.microsoft.com/office/drawing/2010/main" w="12700" cap="flat" cmpd="sng" algn="ctr">
+                <a:solidFill>
+                  <a:schemeClr val="accent1">
+                    <a:shade val="50000"/>
+                  </a:schemeClr>
+                </a:solidFill>
+                <a:prstDash val="solid"/>
+                <a:miter lim="800000"/>
+              </a14:hiddenLine>
+            </a:ext>
+          </a:extLst>
+        </p:spPr>
+        <p:style>
+          <a:lnRef idx="2">
+            <a:schemeClr val="accent1">
+              <a:shade val="50000"/>
+            </a:schemeClr>
+          </a:lnRef>
+          <a:fillRef idx="1">
+            <a:schemeClr val="accent1"/>
+          </a:fillRef>
+          <a:effectRef idx="0">
+            <a:schemeClr val="accent1"/>
+          </a:effectRef>
+          <a:fontRef idx="minor">
+            <a:schemeClr val="lt1"/>
+          </a:fontRef>
+        </p:style>
+        <p:txBody>
+          <a:bodyPr rtlCol="0" anchor="ctr"/>
+          <a:lstStyle/>
+          <a:p>
+            <a:pPr algn="ctr"/>
+            <a:endParaRPr lang="en-US"/>
+          </a:p>
+        </p:txBody>
+      </p:sp>
+      <p:sp>
+        <p:nvSpPr>
+          <p:cNvPr id="23" name="Rectangle 22">
+            <a:extLst>
+              <a:ext uri="{FF2B5EF4-FFF2-40B4-BE49-F238E27FC236}">
+                <a16:creationId xmlns:a16="http://schemas.microsoft.com/office/drawing/2014/main" id="{1199E1B1-A8C0-4FE8-A5A8-1CB41D69F857}"/>
+              </a:ext>
+              <a:ext uri="{C183D7F6-B498-43B3-948B-1728B52AA6E4}">
+                <adec:decorative xmlns:adec="http://schemas.microsoft.com/office/drawing/2017/decorative" val="1"/>
+              </a:ext>
+            </a:extLst>
+          </p:cNvPr>
+          <p:cNvSpPr>
+            <a:spLocks noGrp="1" noRot="1" noChangeAspect="1" noMove="1" noResize="1" noEditPoints="1" noAdjustHandles="1" noChangeArrowheads="1" noChangeShapeType="1" noTextEdit="1"/>
+          </p:cNvSpPr>
+          <p:nvPr>
+            <p:extLst>
+              <p:ext uri="{386F3935-93C4-4BCD-93E2-E3B085C9AB24}">
+                <p16:designElem xmlns:p16="http://schemas.microsoft.com/office/powerpoint/2015/main" val="1"/>
+              </p:ext>
+            </p:extLst>
+          </p:nvPr>
+        </p:nvSpPr>
+        <p:spPr>
+          <a:xfrm rot="10800000" flipH="1">
+            <a:off x="2" y="0"/>
+            <a:ext cx="12191998" cy="1575955"/>
+          </a:xfrm>
+          <a:prstGeom prst="rect">
+            <a:avLst/>
+          </a:prstGeom>
+          <a:gradFill>
+            <a:gsLst>
+              <a:gs pos="0">
+                <a:srgbClr val="000000">
+                  <a:alpha val="96000"/>
+                </a:srgbClr>
+              </a:gs>
+              <a:gs pos="100000">
+                <a:schemeClr val="accent1">
+                  <a:lumMod val="75000"/>
+                </a:schemeClr>
+              </a:gs>
+            </a:gsLst>
+            <a:lin ang="6000000" scaled="0"/>
+          </a:gradFill>
+          <a:ln>
+            <a:noFill/>
+          </a:ln>
+        </p:spPr>
+        <p:style>
+          <a:lnRef idx="2">
+            <a:schemeClr val="accent1">
+              <a:shade val="50000"/>
+            </a:schemeClr>
+          </a:lnRef>
+          <a:fillRef idx="1">
+            <a:schemeClr val="accent1"/>
+          </a:fillRef>
+          <a:effectRef idx="0">
+            <a:schemeClr val="accent1"/>
+          </a:effectRef>
+          <a:fontRef idx="minor">
+            <a:schemeClr val="lt1"/>
+          </a:fontRef>
+        </p:style>
+        <p:txBody>
+          <a:bodyPr rtlCol="0" anchor="ctr"/>
+          <a:lstStyle/>
+          <a:p>
+            <a:pPr algn="ctr"/>
+            <a:endParaRPr lang="en-US"/>
+          </a:p>
+        </p:txBody>
+      </p:sp>
+      <p:sp>
+        <p:nvSpPr>
+          <p:cNvPr id="25" name="Rectangle 24">
+            <a:extLst>
+              <a:ext uri="{FF2B5EF4-FFF2-40B4-BE49-F238E27FC236}">
+                <a16:creationId xmlns:a16="http://schemas.microsoft.com/office/drawing/2014/main" id="{84A8DE83-DE75-4B41-9DB4-A7EC0B0DEC0B}"/>
+              </a:ext>
+              <a:ext uri="{C183D7F6-B498-43B3-948B-1728B52AA6E4}">
+                <adec:decorative xmlns:adec="http://schemas.microsoft.com/office/drawing/2017/decorative" val="1"/>
+              </a:ext>
+            </a:extLst>
+          </p:cNvPr>
+          <p:cNvSpPr>
+            <a:spLocks noGrp="1" noRot="1" noChangeAspect="1" noMove="1" noResize="1" noEditPoints="1" noAdjustHandles="1" noChangeArrowheads="1" noChangeShapeType="1" noTextEdit="1"/>
+          </p:cNvSpPr>
+          <p:nvPr>
+            <p:extLst>
+              <p:ext uri="{386F3935-93C4-4BCD-93E2-E3B085C9AB24}">
+                <p16:designElem xmlns:p16="http://schemas.microsoft.com/office/powerpoint/2015/main" val="1"/>
+              </p:ext>
+            </p:extLst>
+          </p:nvPr>
+        </p:nvSpPr>
+        <p:spPr>
+          <a:xfrm>
+            <a:off x="0" y="0"/>
+            <a:ext cx="8128856" cy="1575461"/>
+          </a:xfrm>
+          <a:prstGeom prst="rect">
+            <a:avLst/>
+          </a:prstGeom>
+          <a:gradFill>
+            <a:gsLst>
+              <a:gs pos="0">
+                <a:schemeClr val="accent1">
+                  <a:alpha val="41000"/>
+                </a:schemeClr>
+              </a:gs>
+              <a:gs pos="74000">
+                <a:schemeClr val="accent1">
+                  <a:lumMod val="60000"/>
+                  <a:lumOff val="40000"/>
+                  <a:alpha val="0"/>
+                </a:schemeClr>
+              </a:gs>
+            </a:gsLst>
+            <a:lin ang="8400000" scaled="0"/>
+          </a:gradFill>
+          <a:ln>
+            <a:noFill/>
+          </a:ln>
+        </p:spPr>
+        <p:style>
+          <a:lnRef idx="2">
+            <a:schemeClr val="accent1">
+              <a:shade val="50000"/>
+            </a:schemeClr>
+          </a:lnRef>
+          <a:fillRef idx="1">
+            <a:schemeClr val="accent1"/>
+          </a:fillRef>
+          <a:effectRef idx="0">
+            <a:schemeClr val="accent1"/>
+          </a:effectRef>
+          <a:fontRef idx="minor">
+            <a:schemeClr val="lt1"/>
+          </a:fontRef>
+        </p:style>
+        <p:txBody>
+          <a:bodyPr rtlCol="0" anchor="ctr"/>
+          <a:lstStyle/>
+          <a:p>
+            <a:pPr algn="ctr"/>
+            <a:endParaRPr lang="en-US"/>
+          </a:p>
+        </p:txBody>
+      </p:sp>
+      <p:sp>
+        <p:nvSpPr>
+          <p:cNvPr id="27" name="Rectangle 26">
+            <a:extLst>
+              <a:ext uri="{FF2B5EF4-FFF2-40B4-BE49-F238E27FC236}">
+                <a16:creationId xmlns:a16="http://schemas.microsoft.com/office/drawing/2014/main" id="{A7009A0A-BEF5-4EAC-AF15-E4F9F002E239}"/>
+              </a:ext>
+              <a:ext uri="{C183D7F6-B498-43B3-948B-1728B52AA6E4}">
+                <adec:decorative xmlns:adec="http://schemas.microsoft.com/office/drawing/2017/decorative" val="1"/>
+              </a:ext>
+            </a:extLst>
+          </p:cNvPr>
+          <p:cNvSpPr>
+            <a:spLocks noGrp="1" noRot="1" noChangeAspect="1" noMove="1" noResize="1" noEditPoints="1" noAdjustHandles="1" noChangeArrowheads="1" noChangeShapeType="1" noTextEdit="1"/>
+          </p:cNvSpPr>
+          <p:nvPr>
+            <p:extLst>
+              <p:ext uri="{386F3935-93C4-4BCD-93E2-E3B085C9AB24}">
+                <p16:designElem xmlns:p16="http://schemas.microsoft.com/office/powerpoint/2015/main" val="1"/>
+              </p:ext>
+            </p:extLst>
+          </p:nvPr>
+        </p:nvSpPr>
+        <p:spPr>
+          <a:xfrm flipH="1">
+            <a:off x="-3" y="-1"/>
+            <a:ext cx="12192002" cy="1574311"/>
+          </a:xfrm>
+          <a:prstGeom prst="rect">
+            <a:avLst/>
+          </a:prstGeom>
+          <a:gradFill>
+            <a:gsLst>
+              <a:gs pos="0">
+                <a:srgbClr val="000000">
+                  <a:alpha val="63000"/>
+                </a:srgbClr>
+              </a:gs>
+              <a:gs pos="78000">
+                <a:schemeClr val="accent1">
+                  <a:alpha val="15000"/>
+                </a:schemeClr>
+              </a:gs>
+            </a:gsLst>
+            <a:lin ang="15600000" scaled="0"/>
+          </a:gradFill>
+          <a:ln>
+            <a:noFill/>
+          </a:ln>
+        </p:spPr>
+        <p:style>
+          <a:lnRef idx="2">
+            <a:schemeClr val="accent1">
+              <a:shade val="50000"/>
+            </a:schemeClr>
+          </a:lnRef>
+          <a:fillRef idx="1">
+            <a:schemeClr val="accent1"/>
+          </a:fillRef>
+          <a:effectRef idx="0">
+            <a:schemeClr val="accent1"/>
+          </a:effectRef>
+          <a:fontRef idx="minor">
+            <a:schemeClr val="lt1"/>
+          </a:fontRef>
+        </p:style>
+        <p:txBody>
+          <a:bodyPr rtlCol="0" anchor="ctr"/>
+          <a:lstStyle/>
+          <a:p>
+            <a:pPr algn="ctr"/>
+            <a:endParaRPr lang="en-US"/>
+          </a:p>
+        </p:txBody>
+      </p:sp>
+      <p:sp>
+        <p:nvSpPr>
+          <p:cNvPr id="2" name="Title 1">
+            <a:extLst>
+              <a:ext uri="{FF2B5EF4-FFF2-40B4-BE49-F238E27FC236}">
+                <a16:creationId xmlns:a16="http://schemas.microsoft.com/office/drawing/2014/main" id="{6D2E7119-6427-EE3F-8C86-8BD1769D529E}"/>
+              </a:ext>
+            </a:extLst>
+          </p:cNvPr>
+          <p:cNvSpPr>
+            <a:spLocks noGrp="1"/>
+          </p:cNvSpPr>
+          <p:nvPr>
+            <p:ph type="title"/>
+          </p:nvPr>
+        </p:nvSpPr>
+        <p:spPr>
+          <a:xfrm>
+            <a:off x="699713" y="248038"/>
+            <a:ext cx="7063721" cy="1159200"/>
+          </a:xfrm>
+        </p:spPr>
+        <p:txBody>
+          <a:bodyPr vert="horz" lIns="91440" tIns="45720" rIns="91440" bIns="45720" rtlCol="0" anchor="ctr">
+            <a:normAutofit/>
+          </a:bodyPr>
+          <a:lstStyle/>
+          <a:p>
+            <a:r>
+              <a:rPr lang="en-US" sz="4000" kern="1200">
+                <a:solidFill>
+                  <a:srgbClr val="FFFFFF"/>
+                </a:solidFill>
+                <a:latin typeface="+mj-lt"/>
+                <a:ea typeface="+mj-ea"/>
+                <a:cs typeface="+mj-cs"/>
+              </a:rPr>
+              <a:t>Swimlane: Submission Process</a:t>
+            </a:r>
+          </a:p>
+        </p:txBody>
+      </p:sp>
+      <p:sp>
+        <p:nvSpPr>
+          <p:cNvPr id="6" name="TextBox 5">
+            <a:extLst>
+              <a:ext uri="{FF2B5EF4-FFF2-40B4-BE49-F238E27FC236}">
+                <a16:creationId xmlns:a16="http://schemas.microsoft.com/office/drawing/2014/main" id="{9AA764F5-33FC-6FE9-43E0-AA5F87C7CE47}"/>
+              </a:ext>
+            </a:extLst>
+          </p:cNvPr>
+          <p:cNvSpPr txBox="1"/>
+          <p:nvPr/>
+        </p:nvSpPr>
+        <p:spPr>
+          <a:xfrm>
+            <a:off x="8572499" y="390832"/>
+            <a:ext cx="3233585" cy="873612"/>
+          </a:xfrm>
+          <a:prstGeom prst="rect">
+            <a:avLst/>
+          </a:prstGeom>
+        </p:spPr>
+        <p:txBody>
+          <a:bodyPr vert="horz" lIns="91440" tIns="45720" rIns="91440" bIns="45720" rtlCol="0" anchor="ctr">
+            <a:normAutofit/>
+          </a:bodyPr>
+          <a:lstStyle/>
+          <a:p>
+            <a:pPr>
+              <a:lnSpc>
+                <a:spcPct val="90000"/>
+              </a:lnSpc>
+              <a:spcBef>
+                <a:spcPts val="1000"/>
+              </a:spcBef>
+            </a:pPr>
+            <a:r>
+              <a:rPr lang="en-US" sz="1700" kern="1200" dirty="0">
+                <a:solidFill>
+                  <a:srgbClr val="FFFFFF"/>
+                </a:solidFill>
+                <a:latin typeface="+mn-lt"/>
+                <a:ea typeface="+mn-ea"/>
+                <a:cs typeface="+mn-cs"/>
+              </a:rPr>
+              <a:t>https://whimsical.com/plan-swimlane-VAsPmCAeFXky6vxRU3CTbn</a:t>
+            </a:r>
+          </a:p>
+        </p:txBody>
+      </p:sp>
+      <p:pic>
+        <p:nvPicPr>
+          <p:cNvPr id="8" name="Picture 7">
+            <a:extLst>
+              <a:ext uri="{FF2B5EF4-FFF2-40B4-BE49-F238E27FC236}">
+                <a16:creationId xmlns:a16="http://schemas.microsoft.com/office/drawing/2014/main" id="{854CC5B8-EB57-C08E-53E4-CE33B1FA5269}"/>
+              </a:ext>
+            </a:extLst>
+          </p:cNvPr>
+          <p:cNvPicPr>
+            <a:picLocks noChangeAspect="1"/>
+          </p:cNvPicPr>
+          <p:nvPr/>
+        </p:nvPicPr>
+        <p:blipFill>
+          <a:blip r:embed="rId2"/>
+          <a:stretch>
+            <a:fillRect/>
+          </a:stretch>
+        </p:blipFill>
+        <p:spPr>
+          <a:xfrm>
+            <a:off x="432225" y="2592357"/>
+            <a:ext cx="11327549" cy="3200031"/>
+          </a:xfrm>
+          <a:prstGeom prst="rect">
+            <a:avLst/>
+          </a:prstGeom>
+        </p:spPr>
+      </p:pic>
+    </p:spTree>
+    <p:extLst>
+      <p:ext uri="{BB962C8B-B14F-4D97-AF65-F5344CB8AC3E}">
+        <p14:creationId xmlns:p14="http://schemas.microsoft.com/office/powerpoint/2010/main" val="1942131109"/>
+      </p:ext>
+    </p:extLst>
+  </p:cSld>
+  <p:clrMapOvr>
+    <a:masterClrMapping/>
+  </p:clrMapOvr>
+</p:sld>
+</file>
+
+<file path=ppt/slides/slide9.xml><?xml version="1.0" encoding="utf-8"?>
 <p:sld xmlns:a="http://schemas.openxmlformats.org/drawingml/2006/main" xmlns:r="http://schemas.openxmlformats.org/officeDocument/2006/relationships" xmlns:p="http://schemas.openxmlformats.org/presentationml/2006/main">
   <p:cSld>
     <p:spTree>
@@ -3735,7 +5832,7 @@
           <p:cNvPr id="2" name="Title 1">
             <a:extLst>
               <a:ext uri="{FF2B5EF4-FFF2-40B4-BE49-F238E27FC236}">
-                <a16:creationId xmlns:a16="http://schemas.microsoft.com/office/drawing/2014/main" id="{100BE286-544B-EB61-29BA-291842622BA9}"/>
+                <a16:creationId xmlns:a16="http://schemas.microsoft.com/office/drawing/2014/main" id="{CE7501DB-CBC0-E3EB-30AC-0C922B5CE5DC}"/>
               </a:ext>
             </a:extLst>
           </p:cNvPr>
@@ -3753,123 +5850,123 @@
           <a:p>
             <a:r>
               <a:rPr lang="en-US" dirty="0"/>
-              <a:t>Pending Actions</a:t>
-            </a:r>
-          </a:p>
-        </p:txBody>
-      </p:sp>
-      <p:sp>
-        <p:nvSpPr>
-          <p:cNvPr id="3" name="Content Placeholder 2">
-            <a:extLst>
-              <a:ext uri="{FF2B5EF4-FFF2-40B4-BE49-F238E27FC236}">
-                <a16:creationId xmlns:a16="http://schemas.microsoft.com/office/drawing/2014/main" id="{65F23957-8987-5928-8255-5CEA3B725750}"/>
-              </a:ext>
-            </a:extLst>
-          </p:cNvPr>
-          <p:cNvSpPr>
-            <a:spLocks noGrp="1"/>
-          </p:cNvSpPr>
+              <a:t>Statistic Calculation Script Verification</a:t>
+            </a:r>
+          </a:p>
+        </p:txBody>
+      </p:sp>
+      <p:pic>
+        <p:nvPicPr>
+          <p:cNvPr id="5" name="Content Placeholder 4" descr="A screenshot of a table&#10;&#10;AI-generated content may be incorrect.">
+            <a:extLst>
+              <a:ext uri="{FF2B5EF4-FFF2-40B4-BE49-F238E27FC236}">
+                <a16:creationId xmlns:a16="http://schemas.microsoft.com/office/drawing/2014/main" id="{A3C6DFD1-1393-9909-4032-A67B2A9808F7}"/>
+              </a:ext>
+            </a:extLst>
+          </p:cNvPr>
+          <p:cNvPicPr>
+            <a:picLocks noGrp="1" noChangeAspect="1"/>
+          </p:cNvPicPr>
           <p:nvPr>
             <p:ph idx="1"/>
           </p:nvPr>
-        </p:nvSpPr>
-        <p:spPr/>
-        <p:txBody>
-          <a:bodyPr/>
-          <a:lstStyle/>
-          <a:p>
-            <a:endParaRPr lang="en-US" dirty="0"/>
-          </a:p>
-        </p:txBody>
-      </p:sp>
+        </p:nvPicPr>
+        <p:blipFill>
+          <a:blip r:embed="rId2">
+            <a:extLst>
+              <a:ext uri="{28A0092B-C50C-407E-A947-70E740481C1C}">
+                <a14:useLocalDpi xmlns:a14="http://schemas.microsoft.com/office/drawing/2010/main" val="0"/>
+              </a:ext>
+            </a:extLst>
+          </a:blip>
+          <a:stretch>
+            <a:fillRect/>
+          </a:stretch>
+        </p:blipFill>
+        <p:spPr>
+          <a:xfrm>
+            <a:off x="2782529" y="4031353"/>
+            <a:ext cx="9409471" cy="1996613"/>
+          </a:xfrm>
+        </p:spPr>
+      </p:pic>
+      <p:pic>
+        <p:nvPicPr>
+          <p:cNvPr id="7" name="Picture 6" descr="A screenshot of a calculator&#10;&#10;AI-generated content may be incorrect.">
+            <a:extLst>
+              <a:ext uri="{FF2B5EF4-FFF2-40B4-BE49-F238E27FC236}">
+                <a16:creationId xmlns:a16="http://schemas.microsoft.com/office/drawing/2014/main" id="{84EE9BCE-CEE0-5A5C-9364-0758521C8A49}"/>
+              </a:ext>
+            </a:extLst>
+          </p:cNvPr>
+          <p:cNvPicPr>
+            <a:picLocks noChangeAspect="1"/>
+          </p:cNvPicPr>
+          <p:nvPr/>
+        </p:nvPicPr>
+        <p:blipFill>
+          <a:blip r:embed="rId3">
+            <a:extLst>
+              <a:ext uri="{28A0092B-C50C-407E-A947-70E740481C1C}">
+                <a14:useLocalDpi xmlns:a14="http://schemas.microsoft.com/office/drawing/2010/main" val="0"/>
+              </a:ext>
+            </a:extLst>
+          </a:blip>
+          <a:stretch>
+            <a:fillRect/>
+          </a:stretch>
+        </p:blipFill>
+        <p:spPr>
+          <a:xfrm>
+            <a:off x="2782529" y="2018857"/>
+            <a:ext cx="7087214" cy="1615580"/>
+          </a:xfrm>
+          <a:prstGeom prst="rect">
+            <a:avLst/>
+          </a:prstGeom>
+        </p:spPr>
+      </p:pic>
+      <p:pic>
+        <p:nvPicPr>
+          <p:cNvPr id="9" name="Picture 8" descr="A black screen with white text">
+            <a:extLst>
+              <a:ext uri="{FF2B5EF4-FFF2-40B4-BE49-F238E27FC236}">
+                <a16:creationId xmlns:a16="http://schemas.microsoft.com/office/drawing/2014/main" id="{89260FBF-4F05-BD32-C723-AA8E86F3B6B7}"/>
+              </a:ext>
+            </a:extLst>
+          </p:cNvPr>
+          <p:cNvPicPr>
+            <a:picLocks noChangeAspect="1"/>
+          </p:cNvPicPr>
+          <p:nvPr/>
+        </p:nvPicPr>
+        <p:blipFill>
+          <a:blip r:embed="rId4">
+            <a:extLst>
+              <a:ext uri="{28A0092B-C50C-407E-A947-70E740481C1C}">
+                <a14:useLocalDpi xmlns:a14="http://schemas.microsoft.com/office/drawing/2010/main" val="0"/>
+              </a:ext>
+            </a:extLst>
+          </a:blip>
+          <a:srcRect t="4389" r="75144" b="-2368"/>
+          <a:stretch>
+            <a:fillRect/>
+          </a:stretch>
+        </p:blipFill>
+        <p:spPr>
+          <a:xfrm>
+            <a:off x="85165" y="1562869"/>
+            <a:ext cx="2388569" cy="4562167"/>
+          </a:xfrm>
+          <a:prstGeom prst="rect">
+            <a:avLst/>
+          </a:prstGeom>
+        </p:spPr>
+      </p:pic>
     </p:spTree>
     <p:extLst>
       <p:ext uri="{BB962C8B-B14F-4D97-AF65-F5344CB8AC3E}">
-        <p14:creationId xmlns:p14="http://schemas.microsoft.com/office/powerpoint/2010/main" val="955631175"/>
-      </p:ext>
-    </p:extLst>
-  </p:cSld>
-  <p:clrMapOvr>
-    <a:masterClrMapping/>
-  </p:clrMapOvr>
-</p:sld>
-</file>
-
-<file path=ppt/slides/slide7.xml><?xml version="1.0" encoding="utf-8"?>
-<p:sld xmlns:a="http://schemas.openxmlformats.org/drawingml/2006/main" xmlns:r="http://schemas.openxmlformats.org/officeDocument/2006/relationships" xmlns:p="http://schemas.openxmlformats.org/presentationml/2006/main">
-  <p:cSld>
-    <p:spTree>
-      <p:nvGrpSpPr>
-        <p:cNvPr id="1" name=""/>
-        <p:cNvGrpSpPr/>
-        <p:nvPr/>
-      </p:nvGrpSpPr>
-      <p:grpSpPr>
-        <a:xfrm>
-          <a:off x="0" y="0"/>
-          <a:ext cx="0" cy="0"/>
-          <a:chOff x="0" y="0"/>
-          <a:chExt cx="0" cy="0"/>
-        </a:xfrm>
-      </p:grpSpPr>
-      <p:sp>
-        <p:nvSpPr>
-          <p:cNvPr id="2" name="Title 1">
-            <a:extLst>
-              <a:ext uri="{FF2B5EF4-FFF2-40B4-BE49-F238E27FC236}">
-                <a16:creationId xmlns:a16="http://schemas.microsoft.com/office/drawing/2014/main" id="{E7E9563F-7A98-D517-B1E1-59F25A8ADA56}"/>
-              </a:ext>
-            </a:extLst>
-          </p:cNvPr>
-          <p:cNvSpPr>
-            <a:spLocks noGrp="1"/>
-          </p:cNvSpPr>
-          <p:nvPr>
-            <p:ph type="title"/>
-          </p:nvPr>
-        </p:nvSpPr>
-        <p:spPr/>
-        <p:txBody>
-          <a:bodyPr/>
-          <a:lstStyle/>
-          <a:p>
-            <a:r>
-              <a:rPr lang="en-US" dirty="0"/>
-              <a:t>Next Steps</a:t>
-            </a:r>
-          </a:p>
-        </p:txBody>
-      </p:sp>
-      <p:sp>
-        <p:nvSpPr>
-          <p:cNvPr id="3" name="Content Placeholder 2">
-            <a:extLst>
-              <a:ext uri="{FF2B5EF4-FFF2-40B4-BE49-F238E27FC236}">
-                <a16:creationId xmlns:a16="http://schemas.microsoft.com/office/drawing/2014/main" id="{57D1A68D-CC96-3D40-ED52-22E5DBBF94F9}"/>
-              </a:ext>
-            </a:extLst>
-          </p:cNvPr>
-          <p:cNvSpPr>
-            <a:spLocks noGrp="1"/>
-          </p:cNvSpPr>
-          <p:nvPr>
-            <p:ph idx="1"/>
-          </p:nvPr>
-        </p:nvSpPr>
-        <p:spPr/>
-        <p:txBody>
-          <a:bodyPr/>
-          <a:lstStyle/>
-          <a:p>
-            <a:endParaRPr lang="en-US" dirty="0"/>
-          </a:p>
-        </p:txBody>
-      </p:sp>
-    </p:spTree>
-    <p:extLst>
-      <p:ext uri="{BB962C8B-B14F-4D97-AF65-F5344CB8AC3E}">
-        <p14:creationId xmlns:p14="http://schemas.microsoft.com/office/powerpoint/2010/main" val="1906549067"/>
+        <p14:creationId xmlns:p14="http://schemas.microsoft.com/office/powerpoint/2010/main" val="1039549293"/>
       </p:ext>
     </p:extLst>
   </p:cSld>

</xml_diff>